<commit_message>
working on ANU talk
</commit_message>
<xml_diff>
--- a/docs/talks/ANU talk/ANU talk results.pptx
+++ b/docs/talks/ANU talk/ANU talk results.pptx
@@ -8,11 +8,11 @@
     <p:notesMasterId r:id="rId22"/>
   </p:notesMasterIdLst>
   <p:sldIdLst>
-    <p:sldId id="276" r:id="rId2"/>
-    <p:sldId id="258" r:id="rId3"/>
-    <p:sldId id="267" r:id="rId4"/>
-    <p:sldId id="269" r:id="rId5"/>
-    <p:sldId id="264" r:id="rId6"/>
+    <p:sldId id="258" r:id="rId2"/>
+    <p:sldId id="267" r:id="rId3"/>
+    <p:sldId id="269" r:id="rId4"/>
+    <p:sldId id="264" r:id="rId5"/>
+    <p:sldId id="278" r:id="rId6"/>
     <p:sldId id="261" r:id="rId7"/>
     <p:sldId id="270" r:id="rId8"/>
     <p:sldId id="262" r:id="rId9"/>
@@ -22,9 +22,9 @@
     <p:sldId id="277" r:id="rId13"/>
     <p:sldId id="273" r:id="rId14"/>
     <p:sldId id="274" r:id="rId15"/>
-    <p:sldId id="256" r:id="rId16"/>
-    <p:sldId id="265" r:id="rId17"/>
-    <p:sldId id="275" r:id="rId18"/>
+    <p:sldId id="275" r:id="rId16"/>
+    <p:sldId id="256" r:id="rId17"/>
+    <p:sldId id="265" r:id="rId18"/>
     <p:sldId id="266" r:id="rId19"/>
     <p:sldId id="257" r:id="rId20"/>
     <p:sldId id="260" r:id="rId21"/>
@@ -216,7 +216,7 @@
           <a:p>
             <a:fld id="{AE895DEC-AA6F-442B-915E-8DD6A1940910}" type="datetimeFigureOut">
               <a:rPr lang="en-AU" smtClean="0"/>
-              <a:t>31/03/2017</a:t>
+              <a:t>3/04/2017</a:t>
             </a:fld>
             <a:endParaRPr lang="en-AU"/>
           </a:p>
@@ -740,7 +740,7 @@
           <a:p>
             <a:fld id="{22120745-CF59-4085-85AB-700AD8916171}" type="slidenum">
               <a:rPr lang="en-AU" smtClean="0"/>
-              <a:t>2</a:t>
+              <a:t>1</a:t>
             </a:fld>
             <a:endParaRPr lang="en-AU"/>
           </a:p>
@@ -824,7 +824,267 @@
           <a:p>
             <a:fld id="{22120745-CF59-4085-85AB-700AD8916171}" type="slidenum">
               <a:rPr lang="en-AU" smtClean="0"/>
-              <a:t>15</a:t>
+              <a:t>10</a:t>
+            </a:fld>
+            <a:endParaRPr lang="en-AU"/>
+          </a:p>
+        </p:txBody>
+      </p:sp>
+    </p:spTree>
+    <p:extLst>
+      <p:ext uri="{BB962C8B-B14F-4D97-AF65-F5344CB8AC3E}">
+        <p14:creationId xmlns:p14="http://schemas.microsoft.com/office/powerpoint/2010/main" val="4091670724"/>
+      </p:ext>
+    </p:extLst>
+  </p:cSld>
+  <p:clrMapOvr>
+    <a:masterClrMapping/>
+  </p:clrMapOvr>
+</p:notes>
+</file>
+
+<file path=ppt/notesSlides/notesSlide11.xml><?xml version="1.0" encoding="utf-8"?>
+<p:notes xmlns:a="http://schemas.openxmlformats.org/drawingml/2006/main" xmlns:r="http://schemas.openxmlformats.org/officeDocument/2006/relationships" xmlns:p="http://schemas.openxmlformats.org/presentationml/2006/main">
+  <p:cSld>
+    <p:spTree>
+      <p:nvGrpSpPr>
+        <p:cNvPr id="1" name=""/>
+        <p:cNvGrpSpPr/>
+        <p:nvPr/>
+      </p:nvGrpSpPr>
+      <p:grpSpPr>
+        <a:xfrm>
+          <a:off x="0" y="0"/>
+          <a:ext cx="0" cy="0"/>
+          <a:chOff x="0" y="0"/>
+          <a:chExt cx="0" cy="0"/>
+        </a:xfrm>
+      </p:grpSpPr>
+      <p:sp>
+        <p:nvSpPr>
+          <p:cNvPr id="2" name="Slide Image Placeholder 1"/>
+          <p:cNvSpPr>
+            <a:spLocks noGrp="1" noRot="1" noChangeAspect="1"/>
+          </p:cNvSpPr>
+          <p:nvPr>
+            <p:ph type="sldImg"/>
+          </p:nvPr>
+        </p:nvSpPr>
+        <p:spPr/>
+      </p:sp>
+      <p:sp>
+        <p:nvSpPr>
+          <p:cNvPr id="3" name="Notes Placeholder 2"/>
+          <p:cNvSpPr>
+            <a:spLocks noGrp="1"/>
+          </p:cNvSpPr>
+          <p:nvPr>
+            <p:ph type="body" idx="1"/>
+          </p:nvPr>
+        </p:nvSpPr>
+        <p:spPr/>
+        <p:txBody>
+          <a:bodyPr/>
+          <a:lstStyle/>
+          <a:p>
+            <a:endParaRPr lang="en-AU" dirty="0"/>
+          </a:p>
+        </p:txBody>
+      </p:sp>
+      <p:sp>
+        <p:nvSpPr>
+          <p:cNvPr id="4" name="Slide Number Placeholder 3"/>
+          <p:cNvSpPr>
+            <a:spLocks noGrp="1"/>
+          </p:cNvSpPr>
+          <p:nvPr>
+            <p:ph type="sldNum" sz="quarter" idx="10"/>
+          </p:nvPr>
+        </p:nvSpPr>
+        <p:spPr/>
+        <p:txBody>
+          <a:bodyPr/>
+          <a:lstStyle/>
+          <a:p>
+            <a:fld id="{22120745-CF59-4085-85AB-700AD8916171}" type="slidenum">
+              <a:rPr lang="en-AU" smtClean="0"/>
+              <a:t>11</a:t>
+            </a:fld>
+            <a:endParaRPr lang="en-AU"/>
+          </a:p>
+        </p:txBody>
+      </p:sp>
+    </p:spTree>
+    <p:extLst>
+      <p:ext uri="{BB962C8B-B14F-4D97-AF65-F5344CB8AC3E}">
+        <p14:creationId xmlns:p14="http://schemas.microsoft.com/office/powerpoint/2010/main" val="3088080119"/>
+      </p:ext>
+    </p:extLst>
+  </p:cSld>
+  <p:clrMapOvr>
+    <a:masterClrMapping/>
+  </p:clrMapOvr>
+</p:notes>
+</file>
+
+<file path=ppt/notesSlides/notesSlide12.xml><?xml version="1.0" encoding="utf-8"?>
+<p:notes xmlns:a="http://schemas.openxmlformats.org/drawingml/2006/main" xmlns:r="http://schemas.openxmlformats.org/officeDocument/2006/relationships" xmlns:p="http://schemas.openxmlformats.org/presentationml/2006/main">
+  <p:cSld>
+    <p:spTree>
+      <p:nvGrpSpPr>
+        <p:cNvPr id="1" name=""/>
+        <p:cNvGrpSpPr/>
+        <p:nvPr/>
+      </p:nvGrpSpPr>
+      <p:grpSpPr>
+        <a:xfrm>
+          <a:off x="0" y="0"/>
+          <a:ext cx="0" cy="0"/>
+          <a:chOff x="0" y="0"/>
+          <a:chExt cx="0" cy="0"/>
+        </a:xfrm>
+      </p:grpSpPr>
+      <p:sp>
+        <p:nvSpPr>
+          <p:cNvPr id="2" name="Slide Image Placeholder 1"/>
+          <p:cNvSpPr>
+            <a:spLocks noGrp="1" noRot="1" noChangeAspect="1"/>
+          </p:cNvSpPr>
+          <p:nvPr>
+            <p:ph type="sldImg"/>
+          </p:nvPr>
+        </p:nvSpPr>
+        <p:spPr/>
+      </p:sp>
+      <p:sp>
+        <p:nvSpPr>
+          <p:cNvPr id="3" name="Notes Placeholder 2"/>
+          <p:cNvSpPr>
+            <a:spLocks noGrp="1"/>
+          </p:cNvSpPr>
+          <p:nvPr>
+            <p:ph type="body" idx="1"/>
+          </p:nvPr>
+        </p:nvSpPr>
+        <p:spPr/>
+        <p:txBody>
+          <a:bodyPr/>
+          <a:lstStyle/>
+          <a:p>
+            <a:endParaRPr lang="en-AU" dirty="0"/>
+          </a:p>
+        </p:txBody>
+      </p:sp>
+      <p:sp>
+        <p:nvSpPr>
+          <p:cNvPr id="4" name="Slide Number Placeholder 3"/>
+          <p:cNvSpPr>
+            <a:spLocks noGrp="1"/>
+          </p:cNvSpPr>
+          <p:nvPr>
+            <p:ph type="sldNum" sz="quarter" idx="10"/>
+          </p:nvPr>
+        </p:nvSpPr>
+        <p:spPr/>
+        <p:txBody>
+          <a:bodyPr/>
+          <a:lstStyle/>
+          <a:p>
+            <a:fld id="{22120745-CF59-4085-85AB-700AD8916171}" type="slidenum">
+              <a:rPr lang="en-AU" smtClean="0"/>
+              <a:t>13</a:t>
+            </a:fld>
+            <a:endParaRPr lang="en-AU"/>
+          </a:p>
+        </p:txBody>
+      </p:sp>
+    </p:spTree>
+    <p:extLst>
+      <p:ext uri="{BB962C8B-B14F-4D97-AF65-F5344CB8AC3E}">
+        <p14:creationId xmlns:p14="http://schemas.microsoft.com/office/powerpoint/2010/main" val="679058633"/>
+      </p:ext>
+    </p:extLst>
+  </p:cSld>
+  <p:clrMapOvr>
+    <a:masterClrMapping/>
+  </p:clrMapOvr>
+</p:notes>
+</file>
+
+<file path=ppt/notesSlides/notesSlide13.xml><?xml version="1.0" encoding="utf-8"?>
+<p:notes xmlns:a="http://schemas.openxmlformats.org/drawingml/2006/main" xmlns:r="http://schemas.openxmlformats.org/officeDocument/2006/relationships" xmlns:p="http://schemas.openxmlformats.org/presentationml/2006/main">
+  <p:cSld>
+    <p:spTree>
+      <p:nvGrpSpPr>
+        <p:cNvPr id="1" name=""/>
+        <p:cNvGrpSpPr/>
+        <p:nvPr/>
+      </p:nvGrpSpPr>
+      <p:grpSpPr>
+        <a:xfrm>
+          <a:off x="0" y="0"/>
+          <a:ext cx="0" cy="0"/>
+          <a:chOff x="0" y="0"/>
+          <a:chExt cx="0" cy="0"/>
+        </a:xfrm>
+      </p:grpSpPr>
+      <p:sp>
+        <p:nvSpPr>
+          <p:cNvPr id="2" name="Slide Image Placeholder 1"/>
+          <p:cNvSpPr>
+            <a:spLocks noGrp="1" noRot="1" noChangeAspect="1"/>
+          </p:cNvSpPr>
+          <p:nvPr>
+            <p:ph type="sldImg"/>
+          </p:nvPr>
+        </p:nvSpPr>
+        <p:spPr/>
+      </p:sp>
+      <p:sp>
+        <p:nvSpPr>
+          <p:cNvPr id="3" name="Notes Placeholder 2"/>
+          <p:cNvSpPr>
+            <a:spLocks noGrp="1"/>
+          </p:cNvSpPr>
+          <p:nvPr>
+            <p:ph type="body" idx="1"/>
+          </p:nvPr>
+        </p:nvSpPr>
+        <p:spPr/>
+        <p:txBody>
+          <a:bodyPr/>
+          <a:lstStyle/>
+          <a:p>
+            <a:r>
+              <a:rPr lang="en-AU" dirty="0" smtClean="0"/>
+              <a:t>Leaf protein content</a:t>
+            </a:r>
+            <a:r>
+              <a:rPr lang="en-AU" baseline="0" dirty="0" smtClean="0"/>
+              <a:t> is strongly determined by nitrogen content, as would be expected. Leaves which have a greater dry mass per area (i.e. thicker, denser leaves) tend to contain more protein, although this effect is variable.</a:t>
+            </a:r>
+            <a:endParaRPr lang="en-AU" dirty="0"/>
+          </a:p>
+        </p:txBody>
+      </p:sp>
+      <p:sp>
+        <p:nvSpPr>
+          <p:cNvPr id="4" name="Slide Number Placeholder 3"/>
+          <p:cNvSpPr>
+            <a:spLocks noGrp="1"/>
+          </p:cNvSpPr>
+          <p:nvPr>
+            <p:ph type="sldNum" sz="quarter" idx="10"/>
+          </p:nvPr>
+        </p:nvSpPr>
+        <p:spPr/>
+        <p:txBody>
+          <a:bodyPr/>
+          <a:lstStyle/>
+          <a:p>
+            <a:fld id="{22120745-CF59-4085-85AB-700AD8916171}" type="slidenum">
+              <a:rPr lang="en-AU" smtClean="0"/>
+              <a:t>16</a:t>
             </a:fld>
             <a:endParaRPr lang="en-AU"/>
           </a:p>
@@ -843,7 +1103,101 @@
 </p:notes>
 </file>
 
-<file path=ppt/notesSlides/notesSlide11.xml><?xml version="1.0" encoding="utf-8"?>
+<file path=ppt/notesSlides/notesSlide14.xml><?xml version="1.0" encoding="utf-8"?>
+<p:notes xmlns:a="http://schemas.openxmlformats.org/drawingml/2006/main" xmlns:r="http://schemas.openxmlformats.org/officeDocument/2006/relationships" xmlns:p="http://schemas.openxmlformats.org/presentationml/2006/main">
+  <p:cSld>
+    <p:spTree>
+      <p:nvGrpSpPr>
+        <p:cNvPr id="1" name=""/>
+        <p:cNvGrpSpPr/>
+        <p:nvPr/>
+      </p:nvGrpSpPr>
+      <p:grpSpPr>
+        <a:xfrm>
+          <a:off x="0" y="0"/>
+          <a:ext cx="0" cy="0"/>
+          <a:chOff x="0" y="0"/>
+          <a:chExt cx="0" cy="0"/>
+        </a:xfrm>
+      </p:grpSpPr>
+      <p:sp>
+        <p:nvSpPr>
+          <p:cNvPr id="2" name="Slide Image Placeholder 1"/>
+          <p:cNvSpPr>
+            <a:spLocks noGrp="1" noRot="1" noChangeAspect="1"/>
+          </p:cNvSpPr>
+          <p:nvPr>
+            <p:ph type="sldImg"/>
+          </p:nvPr>
+        </p:nvSpPr>
+        <p:spPr/>
+      </p:sp>
+      <p:sp>
+        <p:nvSpPr>
+          <p:cNvPr id="3" name="Notes Placeholder 2"/>
+          <p:cNvSpPr>
+            <a:spLocks noGrp="1"/>
+          </p:cNvSpPr>
+          <p:nvPr>
+            <p:ph type="body" idx="1"/>
+          </p:nvPr>
+        </p:nvSpPr>
+        <p:spPr/>
+        <p:txBody>
+          <a:bodyPr/>
+          <a:lstStyle/>
+          <a:p>
+            <a:r>
+              <a:rPr lang="en-AU" dirty="0" smtClean="0"/>
+              <a:t>Leaves don’t produce more photosystem proteins as they become thicker, but they do produce more Calvin</a:t>
+            </a:r>
+            <a:r>
+              <a:rPr lang="en-AU" baseline="0" dirty="0" smtClean="0"/>
+              <a:t> cycle proteins (and pretty much every other category of protein). Suggests that carboxylation capacity is added by leaf thickening but there is no effect on light capture.</a:t>
+            </a:r>
+          </a:p>
+          <a:p>
+            <a:endParaRPr lang="en-AU" baseline="0" dirty="0" smtClean="0"/>
+          </a:p>
+        </p:txBody>
+      </p:sp>
+      <p:sp>
+        <p:nvSpPr>
+          <p:cNvPr id="4" name="Slide Number Placeholder 3"/>
+          <p:cNvSpPr>
+            <a:spLocks noGrp="1"/>
+          </p:cNvSpPr>
+          <p:nvPr>
+            <p:ph type="sldNum" sz="quarter" idx="10"/>
+          </p:nvPr>
+        </p:nvSpPr>
+        <p:spPr/>
+        <p:txBody>
+          <a:bodyPr/>
+          <a:lstStyle/>
+          <a:p>
+            <a:fld id="{22120745-CF59-4085-85AB-700AD8916171}" type="slidenum">
+              <a:rPr lang="en-AU" smtClean="0"/>
+              <a:t>17</a:t>
+            </a:fld>
+            <a:endParaRPr lang="en-AU"/>
+          </a:p>
+        </p:txBody>
+      </p:sp>
+    </p:spTree>
+    <p:extLst>
+      <p:ext uri="{BB962C8B-B14F-4D97-AF65-F5344CB8AC3E}">
+        <p14:creationId xmlns:p14="http://schemas.microsoft.com/office/powerpoint/2010/main" val="3335421596"/>
+      </p:ext>
+    </p:extLst>
+  </p:cSld>
+  <p:clrMapOvr>
+    <a:masterClrMapping/>
+  </p:clrMapOvr>
+</p:notes>
+</file>
+
+<file path=ppt/notesSlides/notesSlide15.xml><?xml version="1.0" encoding="utf-8"?>
 <p:notes xmlns:a="http://schemas.openxmlformats.org/drawingml/2006/main" xmlns:r="http://schemas.openxmlformats.org/officeDocument/2006/relationships" xmlns:p="http://schemas.openxmlformats.org/presentationml/2006/main">
   <p:cSld>
     <p:spTree>
@@ -992,7 +1346,7 @@
           <a:p>
             <a:fld id="{22120745-CF59-4085-85AB-700AD8916171}" type="slidenum">
               <a:rPr lang="en-AU" smtClean="0"/>
-              <a:t>3</a:t>
+              <a:t>2</a:t>
             </a:fld>
             <a:endParaRPr lang="en-AU"/>
           </a:p>
@@ -1076,7 +1430,7 @@
           <a:p>
             <a:fld id="{22120745-CF59-4085-85AB-700AD8916171}" type="slidenum">
               <a:rPr lang="en-AU" smtClean="0"/>
-              <a:t>4</a:t>
+              <a:t>3</a:t>
             </a:fld>
             <a:endParaRPr lang="en-AU"/>
           </a:p>
@@ -1160,7 +1514,7 @@
           <a:p>
             <a:fld id="{22120745-CF59-4085-85AB-700AD8916171}" type="slidenum">
               <a:rPr lang="en-AU" smtClean="0"/>
-              <a:t>5</a:t>
+              <a:t>4</a:t>
             </a:fld>
             <a:endParaRPr lang="en-AU"/>
           </a:p>
@@ -1244,7 +1598,7 @@
           <a:p>
             <a:fld id="{22120745-CF59-4085-85AB-700AD8916171}" type="slidenum">
               <a:rPr lang="en-AU" smtClean="0"/>
-              <a:t>6</a:t>
+              <a:t>5</a:t>
             </a:fld>
             <a:endParaRPr lang="en-AU"/>
           </a:p>
@@ -1253,7 +1607,7 @@
     </p:spTree>
     <p:extLst>
       <p:ext uri="{BB962C8B-B14F-4D97-AF65-F5344CB8AC3E}">
-        <p14:creationId xmlns:p14="http://schemas.microsoft.com/office/powerpoint/2010/main" val="3132291524"/>
+        <p14:creationId xmlns:p14="http://schemas.microsoft.com/office/powerpoint/2010/main" val="837941316"/>
       </p:ext>
     </p:extLst>
   </p:cSld>
@@ -1307,34 +1661,6 @@
           <a:bodyPr/>
           <a:lstStyle/>
           <a:p>
-            <a:r>
-              <a:rPr lang="en-AU" dirty="0" smtClean="0"/>
-              <a:t>Disentangling </a:t>
-            </a:r>
-            <a:r>
-              <a:rPr lang="en-AU" dirty="0" err="1" smtClean="0"/>
-              <a:t>precip</a:t>
-            </a:r>
-            <a:r>
-              <a:rPr lang="en-AU" dirty="0" smtClean="0"/>
-              <a:t> effect</a:t>
-            </a:r>
-            <a:r>
-              <a:rPr lang="en-AU" baseline="0" dirty="0" smtClean="0"/>
-              <a:t> – if you look at </a:t>
-            </a:r>
-            <a:r>
-              <a:rPr lang="en-AU" baseline="0" dirty="0" err="1" smtClean="0"/>
-              <a:t>precip</a:t>
-            </a:r>
-            <a:r>
-              <a:rPr lang="en-AU" baseline="0" dirty="0" smtClean="0"/>
-              <a:t> over just the last year, there’s a much weaker correlation. Could mean that we’re really interested in time averaged effect on vegetation structure and light </a:t>
-            </a:r>
-            <a:r>
-              <a:rPr lang="en-AU" baseline="0" dirty="0" err="1" smtClean="0"/>
-              <a:t>evnrio</a:t>
-            </a:r>
             <a:endParaRPr lang="en-AU" dirty="0"/>
           </a:p>
         </p:txBody>
@@ -1356,7 +1682,7 @@
           <a:p>
             <a:fld id="{22120745-CF59-4085-85AB-700AD8916171}" type="slidenum">
               <a:rPr lang="en-AU" smtClean="0"/>
-              <a:t>7</a:t>
+              <a:t>6</a:t>
             </a:fld>
             <a:endParaRPr lang="en-AU"/>
           </a:p>
@@ -1365,7 +1691,7 @@
     </p:spTree>
     <p:extLst>
       <p:ext uri="{BB962C8B-B14F-4D97-AF65-F5344CB8AC3E}">
-        <p14:creationId xmlns:p14="http://schemas.microsoft.com/office/powerpoint/2010/main" val="660128302"/>
+        <p14:creationId xmlns:p14="http://schemas.microsoft.com/office/powerpoint/2010/main" val="3132291524"/>
       </p:ext>
     </p:extLst>
   </p:cSld>
@@ -1468,7 +1794,7 @@
           <a:p>
             <a:fld id="{22120745-CF59-4085-85AB-700AD8916171}" type="slidenum">
               <a:rPr lang="en-AU" smtClean="0"/>
-              <a:t>8</a:t>
+              <a:t>7</a:t>
             </a:fld>
             <a:endParaRPr lang="en-AU"/>
           </a:p>
@@ -1477,7 +1803,7 @@
     </p:spTree>
     <p:extLst>
       <p:ext uri="{BB962C8B-B14F-4D97-AF65-F5344CB8AC3E}">
-        <p14:creationId xmlns:p14="http://schemas.microsoft.com/office/powerpoint/2010/main" val="1830139918"/>
+        <p14:creationId xmlns:p14="http://schemas.microsoft.com/office/powerpoint/2010/main" val="660128302"/>
       </p:ext>
     </p:extLst>
   </p:cSld>
@@ -1531,6 +1857,34 @@
           <a:bodyPr/>
           <a:lstStyle/>
           <a:p>
+            <a:r>
+              <a:rPr lang="en-AU" dirty="0" smtClean="0"/>
+              <a:t>Disentangling </a:t>
+            </a:r>
+            <a:r>
+              <a:rPr lang="en-AU" dirty="0" err="1" smtClean="0"/>
+              <a:t>precip</a:t>
+            </a:r>
+            <a:r>
+              <a:rPr lang="en-AU" dirty="0" smtClean="0"/>
+              <a:t> effect</a:t>
+            </a:r>
+            <a:r>
+              <a:rPr lang="en-AU" baseline="0" dirty="0" smtClean="0"/>
+              <a:t> – if you look at </a:t>
+            </a:r>
+            <a:r>
+              <a:rPr lang="en-AU" baseline="0" dirty="0" err="1" smtClean="0"/>
+              <a:t>precip</a:t>
+            </a:r>
+            <a:r>
+              <a:rPr lang="en-AU" baseline="0" dirty="0" smtClean="0"/>
+              <a:t> over just the last year, there’s a much weaker correlation. Could mean that we’re really interested in time averaged effect on vegetation structure and light </a:t>
+            </a:r>
+            <a:r>
+              <a:rPr lang="en-AU" baseline="0" dirty="0" err="1" smtClean="0"/>
+              <a:t>evnrio</a:t>
+            </a:r>
             <a:endParaRPr lang="en-AU" dirty="0"/>
           </a:p>
         </p:txBody>
@@ -1552,7 +1906,7 @@
           <a:p>
             <a:fld id="{22120745-CF59-4085-85AB-700AD8916171}" type="slidenum">
               <a:rPr lang="en-AU" smtClean="0"/>
-              <a:t>9</a:t>
+              <a:t>8</a:t>
             </a:fld>
             <a:endParaRPr lang="en-AU"/>
           </a:p>
@@ -1561,7 +1915,7 @@
     </p:spTree>
     <p:extLst>
       <p:ext uri="{BB962C8B-B14F-4D97-AF65-F5344CB8AC3E}">
-        <p14:creationId xmlns:p14="http://schemas.microsoft.com/office/powerpoint/2010/main" val="2451425241"/>
+        <p14:creationId xmlns:p14="http://schemas.microsoft.com/office/powerpoint/2010/main" val="1830139918"/>
       </p:ext>
     </p:extLst>
   </p:cSld>
@@ -1636,7 +1990,7 @@
           <a:p>
             <a:fld id="{22120745-CF59-4085-85AB-700AD8916171}" type="slidenum">
               <a:rPr lang="en-AU" smtClean="0"/>
-              <a:t>13</a:t>
+              <a:t>9</a:t>
             </a:fld>
             <a:endParaRPr lang="en-AU"/>
           </a:p>
@@ -1645,7 +1999,7 @@
     </p:spTree>
     <p:extLst>
       <p:ext uri="{BB962C8B-B14F-4D97-AF65-F5344CB8AC3E}">
-        <p14:creationId xmlns:p14="http://schemas.microsoft.com/office/powerpoint/2010/main" val="679058633"/>
+        <p14:creationId xmlns:p14="http://schemas.microsoft.com/office/powerpoint/2010/main" val="2451425241"/>
       </p:ext>
     </p:extLst>
   </p:cSld>
@@ -1786,7 +2140,7 @@
           <a:p>
             <a:fld id="{C216EA5E-5C9C-4DF9-A116-626E51481C23}" type="datetimeFigureOut">
               <a:rPr lang="en-AU" smtClean="0"/>
-              <a:t>31/03/2017</a:t>
+              <a:t>3/04/2017</a:t>
             </a:fld>
             <a:endParaRPr lang="en-AU"/>
           </a:p>
@@ -1956,7 +2310,7 @@
           <a:p>
             <a:fld id="{C216EA5E-5C9C-4DF9-A116-626E51481C23}" type="datetimeFigureOut">
               <a:rPr lang="en-AU" smtClean="0"/>
-              <a:t>31/03/2017</a:t>
+              <a:t>3/04/2017</a:t>
             </a:fld>
             <a:endParaRPr lang="en-AU"/>
           </a:p>
@@ -2136,7 +2490,7 @@
           <a:p>
             <a:fld id="{C216EA5E-5C9C-4DF9-A116-626E51481C23}" type="datetimeFigureOut">
               <a:rPr lang="en-AU" smtClean="0"/>
-              <a:t>31/03/2017</a:t>
+              <a:t>3/04/2017</a:t>
             </a:fld>
             <a:endParaRPr lang="en-AU"/>
           </a:p>
@@ -2306,7 +2660,7 @@
           <a:p>
             <a:fld id="{C216EA5E-5C9C-4DF9-A116-626E51481C23}" type="datetimeFigureOut">
               <a:rPr lang="en-AU" smtClean="0"/>
-              <a:t>31/03/2017</a:t>
+              <a:t>3/04/2017</a:t>
             </a:fld>
             <a:endParaRPr lang="en-AU"/>
           </a:p>
@@ -2552,7 +2906,7 @@
           <a:p>
             <a:fld id="{C216EA5E-5C9C-4DF9-A116-626E51481C23}" type="datetimeFigureOut">
               <a:rPr lang="en-AU" smtClean="0"/>
-              <a:t>31/03/2017</a:t>
+              <a:t>3/04/2017</a:t>
             </a:fld>
             <a:endParaRPr lang="en-AU"/>
           </a:p>
@@ -2784,7 +3138,7 @@
           <a:p>
             <a:fld id="{C216EA5E-5C9C-4DF9-A116-626E51481C23}" type="datetimeFigureOut">
               <a:rPr lang="en-AU" smtClean="0"/>
-              <a:t>31/03/2017</a:t>
+              <a:t>3/04/2017</a:t>
             </a:fld>
             <a:endParaRPr lang="en-AU"/>
           </a:p>
@@ -3151,7 +3505,7 @@
           <a:p>
             <a:fld id="{C216EA5E-5C9C-4DF9-A116-626E51481C23}" type="datetimeFigureOut">
               <a:rPr lang="en-AU" smtClean="0"/>
-              <a:t>31/03/2017</a:t>
+              <a:t>3/04/2017</a:t>
             </a:fld>
             <a:endParaRPr lang="en-AU"/>
           </a:p>
@@ -3269,7 +3623,7 @@
           <a:p>
             <a:fld id="{C216EA5E-5C9C-4DF9-A116-626E51481C23}" type="datetimeFigureOut">
               <a:rPr lang="en-AU" smtClean="0"/>
-              <a:t>31/03/2017</a:t>
+              <a:t>3/04/2017</a:t>
             </a:fld>
             <a:endParaRPr lang="en-AU"/>
           </a:p>
@@ -3364,7 +3718,7 @@
           <a:p>
             <a:fld id="{C216EA5E-5C9C-4DF9-A116-626E51481C23}" type="datetimeFigureOut">
               <a:rPr lang="en-AU" smtClean="0"/>
-              <a:t>31/03/2017</a:t>
+              <a:t>3/04/2017</a:t>
             </a:fld>
             <a:endParaRPr lang="en-AU"/>
           </a:p>
@@ -3641,7 +3995,7 @@
           <a:p>
             <a:fld id="{C216EA5E-5C9C-4DF9-A116-626E51481C23}" type="datetimeFigureOut">
               <a:rPr lang="en-AU" smtClean="0"/>
-              <a:t>31/03/2017</a:t>
+              <a:t>3/04/2017</a:t>
             </a:fld>
             <a:endParaRPr lang="en-AU"/>
           </a:p>
@@ -3894,7 +4248,7 @@
           <a:p>
             <a:fld id="{C216EA5E-5C9C-4DF9-A116-626E51481C23}" type="datetimeFigureOut">
               <a:rPr lang="en-AU" smtClean="0"/>
-              <a:t>31/03/2017</a:t>
+              <a:t>3/04/2017</a:t>
             </a:fld>
             <a:endParaRPr lang="en-AU"/>
           </a:p>
@@ -4107,7 +4461,7 @@
           <a:p>
             <a:fld id="{C216EA5E-5C9C-4DF9-A116-626E51481C23}" type="datetimeFigureOut">
               <a:rPr lang="en-AU" smtClean="0"/>
-              <a:t>31/03/2017</a:t>
+              <a:t>3/04/2017</a:t>
             </a:fld>
             <a:endParaRPr lang="en-AU"/>
           </a:p>
@@ -4514,54 +4868,110 @@
       </p:grpSpPr>
       <p:sp>
         <p:nvSpPr>
-          <p:cNvPr id="2" name="Title 1"/>
-          <p:cNvSpPr>
-            <a:spLocks noGrp="1"/>
-          </p:cNvSpPr>
-          <p:nvPr>
-            <p:ph type="title"/>
-          </p:nvPr>
-        </p:nvSpPr>
-        <p:spPr/>
-        <p:txBody>
-          <a:bodyPr/>
+          <p:cNvPr id="11" name="TextBox 10"/>
+          <p:cNvSpPr txBox="1"/>
+          <p:nvPr/>
+        </p:nvSpPr>
+        <p:spPr>
+          <a:xfrm>
+            <a:off x="107359" y="6323934"/>
+            <a:ext cx="7312943" cy="369332"/>
+          </a:xfrm>
+          <a:prstGeom prst="rect">
+            <a:avLst/>
+          </a:prstGeom>
+          <a:noFill/>
+        </p:spPr>
+        <p:txBody>
+          <a:bodyPr wrap="square" rtlCol="0">
+            <a:spAutoFit/>
+          </a:bodyPr>
           <a:lstStyle/>
           <a:p>
             <a:r>
               <a:rPr lang="en-AU" dirty="0" smtClean="0"/>
-              <a:t>Co-ordination hypothesis</a:t>
+              <a:t>Protein </a:t>
+            </a:r>
+            <a:r>
+              <a:rPr lang="en-AU" dirty="0" smtClean="0"/>
+              <a:t>content ranges between 2 and </a:t>
+            </a:r>
+            <a:r>
+              <a:rPr lang="en-AU" dirty="0" smtClean="0"/>
+              <a:t>27 % of leaf mass </a:t>
+            </a:r>
+            <a:r>
+              <a:rPr lang="en-AU" dirty="0" smtClean="0"/>
+              <a:t>(mean 11%, SD 4%)</a:t>
             </a:r>
             <a:endParaRPr lang="en-AU" dirty="0"/>
           </a:p>
         </p:txBody>
       </p:sp>
-      <p:sp>
-        <p:nvSpPr>
-          <p:cNvPr id="3" name="Content Placeholder 2"/>
-          <p:cNvSpPr>
-            <a:spLocks noGrp="1"/>
-          </p:cNvSpPr>
-          <p:nvPr>
-            <p:ph idx="1"/>
-          </p:nvPr>
-        </p:nvSpPr>
-        <p:spPr/>
-        <p:txBody>
-          <a:bodyPr/>
-          <a:lstStyle/>
-          <a:p>
-            <a:r>
-              <a:rPr lang="en-AU" dirty="0" smtClean="0"/>
-              <a:t>Leaves should optimise protein allocation/investment such that energy capture and carboxylation are co-limiting under average daytime conditions</a:t>
-            </a:r>
-            <a:endParaRPr lang="en-AU" dirty="0"/>
+      <p:pic>
+        <p:nvPicPr>
+          <p:cNvPr id="12" name="Picture 11"/>
+          <p:cNvPicPr>
+            <a:picLocks noChangeAspect="1"/>
+          </p:cNvPicPr>
+          <p:nvPr/>
+        </p:nvPicPr>
+        <p:blipFill>
+          <a:blip r:embed="rId3" cstate="print">
+            <a:extLst>
+              <a:ext uri="{28A0092B-C50C-407E-A947-70E740481C1C}">
+                <a14:useLocalDpi xmlns:a14="http://schemas.microsoft.com/office/drawing/2010/main" val="0"/>
+              </a:ext>
+            </a:extLst>
+          </a:blip>
+          <a:stretch>
+            <a:fillRect/>
+          </a:stretch>
+        </p:blipFill>
+        <p:spPr>
+          <a:xfrm>
+            <a:off x="1633979" y="665756"/>
+            <a:ext cx="8924042" cy="5526488"/>
+          </a:xfrm>
+          <a:prstGeom prst="rect">
+            <a:avLst/>
+          </a:prstGeom>
+        </p:spPr>
+      </p:pic>
+      <p:sp>
+        <p:nvSpPr>
+          <p:cNvPr id="13" name="TextBox 12"/>
+          <p:cNvSpPr txBox="1"/>
+          <p:nvPr/>
+        </p:nvSpPr>
+        <p:spPr>
+          <a:xfrm>
+            <a:off x="546755" y="263951"/>
+            <a:ext cx="4675694" cy="646331"/>
+          </a:xfrm>
+          <a:prstGeom prst="rect">
+            <a:avLst/>
+          </a:prstGeom>
+          <a:noFill/>
+        </p:spPr>
+        <p:txBody>
+          <a:bodyPr wrap="square" rtlCol="0">
+            <a:spAutoFit/>
+          </a:bodyPr>
+          <a:lstStyle/>
+          <a:p>
+            <a:r>
+              <a:rPr lang="en-AU" sz="3600" dirty="0" smtClean="0"/>
+              <a:t>What’s in a leaf?</a:t>
+            </a:r>
+            <a:endParaRPr lang="en-AU" sz="3600" dirty="0"/>
           </a:p>
         </p:txBody>
       </p:sp>
     </p:spTree>
     <p:extLst>
       <p:ext uri="{BB962C8B-B14F-4D97-AF65-F5344CB8AC3E}">
-        <p14:creationId xmlns:p14="http://schemas.microsoft.com/office/powerpoint/2010/main" val="21861817"/>
+        <p14:creationId xmlns:p14="http://schemas.microsoft.com/office/powerpoint/2010/main" val="4224053659"/>
       </p:ext>
     </p:extLst>
   </p:cSld>
@@ -4588,76 +4998,9 @@
           <a:chExt cx="0" cy="0"/>
         </a:xfrm>
       </p:grpSpPr>
-      <p:sp>
-        <p:nvSpPr>
-          <p:cNvPr id="2" name="Title 1"/>
-          <p:cNvSpPr>
-            <a:spLocks noGrp="1"/>
-          </p:cNvSpPr>
-          <p:nvPr>
-            <p:ph type="title"/>
-          </p:nvPr>
-        </p:nvSpPr>
-        <p:spPr>
-          <a:xfrm>
-            <a:off x="3148140" y="294130"/>
-            <a:ext cx="5949099" cy="1325563"/>
-          </a:xfrm>
-        </p:spPr>
-        <p:txBody>
-          <a:bodyPr>
-            <a:normAutofit/>
-          </a:bodyPr>
-          <a:lstStyle/>
-          <a:p>
-            <a:r>
-              <a:rPr lang="en-AU" sz="3200" dirty="0" smtClean="0"/>
-              <a:t>Marginal influence of environment </a:t>
-            </a:r>
-            <a:br>
-              <a:rPr lang="en-AU" sz="3200" dirty="0" smtClean="0"/>
-            </a:br>
-            <a:r>
-              <a:rPr lang="en-AU" sz="3200" dirty="0" smtClean="0"/>
-              <a:t>on investment in Calvin cycle</a:t>
-            </a:r>
-            <a:endParaRPr lang="en-AU" sz="3200" dirty="0"/>
-          </a:p>
-        </p:txBody>
-      </p:sp>
       <p:pic>
         <p:nvPicPr>
           <p:cNvPr id="4" name="Picture 3"/>
-          <p:cNvPicPr>
-            <a:picLocks noChangeAspect="1"/>
-          </p:cNvPicPr>
-          <p:nvPr/>
-        </p:nvPicPr>
-        <p:blipFill>
-          <a:blip r:embed="rId2" cstate="print">
-            <a:extLst>
-              <a:ext uri="{28A0092B-C50C-407E-A947-70E740481C1C}">
-                <a14:useLocalDpi xmlns:a14="http://schemas.microsoft.com/office/drawing/2010/main" val="0"/>
-              </a:ext>
-            </a:extLst>
-          </a:blip>
-          <a:stretch>
-            <a:fillRect/>
-          </a:stretch>
-        </p:blipFill>
-        <p:spPr>
-          <a:xfrm>
-            <a:off x="156751" y="2064486"/>
-            <a:ext cx="3929630" cy="2429028"/>
-          </a:xfrm>
-          <a:prstGeom prst="rect">
-            <a:avLst/>
-          </a:prstGeom>
-        </p:spPr>
-      </p:pic>
-      <p:pic>
-        <p:nvPicPr>
-          <p:cNvPr id="5" name="Picture 4"/>
           <p:cNvPicPr>
             <a:picLocks noChangeAspect="1"/>
           </p:cNvPicPr>
@@ -4677,7 +5020,7 @@
         </p:blipFill>
         <p:spPr>
           <a:xfrm>
-            <a:off x="4157876" y="2064486"/>
+            <a:off x="156751" y="2064486"/>
             <a:ext cx="3929630" cy="2429028"/>
           </a:xfrm>
           <a:prstGeom prst="rect">
@@ -4687,7 +5030,7 @@
       </p:pic>
       <p:pic>
         <p:nvPicPr>
-          <p:cNvPr id="6" name="Picture 5"/>
+          <p:cNvPr id="5" name="Picture 4"/>
           <p:cNvPicPr>
             <a:picLocks noChangeAspect="1"/>
           </p:cNvPicPr>
@@ -4707,7 +5050,7 @@
         </p:blipFill>
         <p:spPr>
           <a:xfrm>
-            <a:off x="8159002" y="2064486"/>
+            <a:off x="4157876" y="2064486"/>
             <a:ext cx="3929630" cy="2429028"/>
           </a:xfrm>
           <a:prstGeom prst="rect">
@@ -4715,153 +5058,9 @@
           </a:prstGeom>
         </p:spPr>
       </p:pic>
-      <p:sp>
-        <p:nvSpPr>
-          <p:cNvPr id="7" name="TextBox 6"/>
-          <p:cNvSpPr txBox="1"/>
-          <p:nvPr/>
-        </p:nvSpPr>
-        <p:spPr>
-          <a:xfrm>
-            <a:off x="838200" y="3591613"/>
-            <a:ext cx="2027548" cy="369332"/>
-          </a:xfrm>
-          <a:prstGeom prst="rect">
-            <a:avLst/>
-          </a:prstGeom>
-          <a:noFill/>
-        </p:spPr>
-        <p:txBody>
-          <a:bodyPr wrap="square" rtlCol="0">
-            <a:spAutoFit/>
-          </a:bodyPr>
-          <a:lstStyle/>
-          <a:p>
-            <a:r>
-              <a:rPr lang="en-AU" dirty="0" smtClean="0"/>
-              <a:t>p = 0.19</a:t>
-            </a:r>
-            <a:endParaRPr lang="en-AU" dirty="0"/>
-          </a:p>
-        </p:txBody>
-      </p:sp>
-      <p:sp>
-        <p:nvSpPr>
-          <p:cNvPr id="8" name="TextBox 7"/>
-          <p:cNvSpPr txBox="1"/>
-          <p:nvPr/>
-        </p:nvSpPr>
-        <p:spPr>
-          <a:xfrm>
-            <a:off x="8550897" y="3591613"/>
-            <a:ext cx="2027548" cy="369332"/>
-          </a:xfrm>
-          <a:prstGeom prst="rect">
-            <a:avLst/>
-          </a:prstGeom>
-          <a:noFill/>
-        </p:spPr>
-        <p:txBody>
-          <a:bodyPr wrap="square" rtlCol="0">
-            <a:spAutoFit/>
-          </a:bodyPr>
-          <a:lstStyle/>
-          <a:p>
-            <a:r>
-              <a:rPr lang="en-AU" dirty="0" smtClean="0"/>
-              <a:t>p = 0.07</a:t>
-            </a:r>
-            <a:endParaRPr lang="en-AU" dirty="0"/>
-          </a:p>
-        </p:txBody>
-      </p:sp>
-      <p:sp>
-        <p:nvSpPr>
-          <p:cNvPr id="9" name="TextBox 8"/>
-          <p:cNvSpPr txBox="1"/>
-          <p:nvPr/>
-        </p:nvSpPr>
-        <p:spPr>
-          <a:xfrm>
-            <a:off x="4489516" y="3591613"/>
-            <a:ext cx="2027548" cy="369332"/>
-          </a:xfrm>
-          <a:prstGeom prst="rect">
-            <a:avLst/>
-          </a:prstGeom>
-          <a:noFill/>
-        </p:spPr>
-        <p:txBody>
-          <a:bodyPr wrap="square" rtlCol="0">
-            <a:spAutoFit/>
-          </a:bodyPr>
-          <a:lstStyle/>
-          <a:p>
-            <a:r>
-              <a:rPr lang="en-AU" b="1" dirty="0" smtClean="0"/>
-              <a:t>p =0.02, R</a:t>
-            </a:r>
-            <a:r>
-              <a:rPr lang="en-AU" b="1" baseline="30000" dirty="0" smtClean="0"/>
-              <a:t>2</a:t>
-            </a:r>
-            <a:r>
-              <a:rPr lang="en-AU" b="1" dirty="0" smtClean="0"/>
-              <a:t> = 0.16</a:t>
-            </a:r>
-            <a:endParaRPr lang="en-AU" b="1" dirty="0"/>
-          </a:p>
-        </p:txBody>
-      </p:sp>
-      <p:sp>
-        <p:nvSpPr>
-          <p:cNvPr id="10" name="Rectangle 9"/>
-          <p:cNvSpPr/>
-          <p:nvPr/>
-        </p:nvSpPr>
-        <p:spPr>
-          <a:xfrm>
-            <a:off x="4131557" y="1951348"/>
-            <a:ext cx="3965376" cy="2542166"/>
-          </a:xfrm>
-          <a:prstGeom prst="rect">
-            <a:avLst/>
-          </a:prstGeom>
-          <a:noFill/>
-          <a:ln w="19050">
-            <a:solidFill>
-              <a:srgbClr val="00B050"/>
-            </a:solidFill>
-          </a:ln>
-        </p:spPr>
-        <p:style>
-          <a:lnRef idx="2">
-            <a:schemeClr val="accent1">
-              <a:shade val="50000"/>
-            </a:schemeClr>
-          </a:lnRef>
-          <a:fillRef idx="1">
-            <a:schemeClr val="accent1"/>
-          </a:fillRef>
-          <a:effectRef idx="0">
-            <a:schemeClr val="accent1"/>
-          </a:effectRef>
-          <a:fontRef idx="minor">
-            <a:schemeClr val="lt1"/>
-          </a:fontRef>
-        </p:style>
-        <p:txBody>
-          <a:bodyPr rtlCol="0" anchor="ctr"/>
-          <a:lstStyle/>
-          <a:p>
-            <a:pPr algn="ctr"/>
-            <a:endParaRPr lang="en-AU"/>
-          </a:p>
-        </p:txBody>
-      </p:sp>
       <p:pic>
         <p:nvPicPr>
-          <p:cNvPr id="11" name="Picture 10"/>
+          <p:cNvPr id="6" name="Picture 5"/>
           <p:cNvPicPr>
             <a:picLocks noChangeAspect="1"/>
           </p:cNvPicPr>
@@ -4881,8 +5080,8 @@
         </p:blipFill>
         <p:spPr>
           <a:xfrm>
-            <a:off x="7463960" y="3591613"/>
-            <a:ext cx="659294" cy="659294"/>
+            <a:off x="8159002" y="2064486"/>
+            <a:ext cx="3929630" cy="2429028"/>
           </a:xfrm>
           <a:prstGeom prst="rect">
             <a:avLst/>
@@ -4891,106 +5090,74 @@
       </p:pic>
       <p:sp>
         <p:nvSpPr>
-          <p:cNvPr id="15" name="Rectangle 14"/>
-          <p:cNvSpPr/>
+          <p:cNvPr id="7" name="TextBox 6"/>
+          <p:cNvSpPr txBox="1"/>
           <p:nvPr/>
         </p:nvSpPr>
         <p:spPr>
           <a:xfrm>
-            <a:off x="122966" y="1951348"/>
-            <a:ext cx="3965376" cy="2542166"/>
+            <a:off x="838200" y="3591613"/>
+            <a:ext cx="2027548" cy="369332"/>
           </a:xfrm>
           <a:prstGeom prst="rect">
             <a:avLst/>
           </a:prstGeom>
           <a:noFill/>
-          <a:ln w="19050">
-            <a:solidFill>
-              <a:srgbClr val="FF0000"/>
-            </a:solidFill>
-          </a:ln>
-        </p:spPr>
-        <p:style>
-          <a:lnRef idx="2">
-            <a:schemeClr val="accent1">
-              <a:shade val="50000"/>
-            </a:schemeClr>
-          </a:lnRef>
-          <a:fillRef idx="1">
-            <a:schemeClr val="accent1"/>
-          </a:fillRef>
-          <a:effectRef idx="0">
-            <a:schemeClr val="accent1"/>
-          </a:effectRef>
-          <a:fontRef idx="minor">
-            <a:schemeClr val="lt1"/>
-          </a:fontRef>
-        </p:style>
-        <p:txBody>
-          <a:bodyPr rtlCol="0" anchor="ctr"/>
-          <a:lstStyle/>
-          <a:p>
-            <a:pPr algn="ctr"/>
-            <a:endParaRPr lang="en-AU"/>
-          </a:p>
-        </p:txBody>
-      </p:sp>
-      <p:sp>
-        <p:nvSpPr>
-          <p:cNvPr id="16" name="Rectangle 15"/>
-          <p:cNvSpPr/>
+        </p:spPr>
+        <p:txBody>
+          <a:bodyPr wrap="square" rtlCol="0">
+            <a:spAutoFit/>
+          </a:bodyPr>
+          <a:lstStyle/>
+          <a:p>
+            <a:r>
+              <a:rPr lang="en-AU" dirty="0" smtClean="0"/>
+              <a:t>p = 0.19</a:t>
+            </a:r>
+            <a:endParaRPr lang="en-AU" dirty="0"/>
+          </a:p>
+        </p:txBody>
+      </p:sp>
+      <p:sp>
+        <p:nvSpPr>
+          <p:cNvPr id="8" name="TextBox 7"/>
+          <p:cNvSpPr txBox="1"/>
           <p:nvPr/>
         </p:nvSpPr>
         <p:spPr>
           <a:xfrm>
-            <a:off x="8141129" y="1951348"/>
-            <a:ext cx="3965376" cy="2542166"/>
+            <a:off x="8550897" y="3591613"/>
+            <a:ext cx="2027548" cy="369332"/>
           </a:xfrm>
           <a:prstGeom prst="rect">
             <a:avLst/>
           </a:prstGeom>
           <a:noFill/>
-          <a:ln w="19050">
-            <a:solidFill>
-              <a:srgbClr val="FF0000"/>
-            </a:solidFill>
-          </a:ln>
-        </p:spPr>
-        <p:style>
-          <a:lnRef idx="2">
-            <a:schemeClr val="accent1">
-              <a:shade val="50000"/>
-            </a:schemeClr>
-          </a:lnRef>
-          <a:fillRef idx="1">
-            <a:schemeClr val="accent1"/>
-          </a:fillRef>
-          <a:effectRef idx="0">
-            <a:schemeClr val="accent1"/>
-          </a:effectRef>
-          <a:fontRef idx="minor">
-            <a:schemeClr val="lt1"/>
-          </a:fontRef>
-        </p:style>
-        <p:txBody>
-          <a:bodyPr rtlCol="0" anchor="ctr"/>
-          <a:lstStyle/>
-          <a:p>
-            <a:pPr algn="ctr"/>
-            <a:endParaRPr lang="en-AU"/>
-          </a:p>
-        </p:txBody>
-      </p:sp>
-      <p:sp>
-        <p:nvSpPr>
-          <p:cNvPr id="3" name="TextBox 2"/>
+        </p:spPr>
+        <p:txBody>
+          <a:bodyPr wrap="square" rtlCol="0">
+            <a:spAutoFit/>
+          </a:bodyPr>
+          <a:lstStyle/>
+          <a:p>
+            <a:r>
+              <a:rPr lang="en-AU" dirty="0" smtClean="0"/>
+              <a:t>p = 0.07</a:t>
+            </a:r>
+            <a:endParaRPr lang="en-AU" dirty="0"/>
+          </a:p>
+        </p:txBody>
+      </p:sp>
+      <p:sp>
+        <p:nvSpPr>
+          <p:cNvPr id="9" name="TextBox 8"/>
           <p:cNvSpPr txBox="1"/>
           <p:nvPr/>
         </p:nvSpPr>
         <p:spPr>
           <a:xfrm>
-            <a:off x="1630837" y="5175315"/>
-            <a:ext cx="8578392" cy="1200329"/>
+            <a:off x="4489516" y="3591613"/>
+            <a:ext cx="3256608" cy="369332"/>
           </a:xfrm>
           <a:prstGeom prst="rect">
             <a:avLst/>
@@ -5005,17 +5172,115 @@
           <a:p>
             <a:r>
               <a:rPr lang="en-AU" dirty="0" smtClean="0"/>
-              <a:t>Calvin cycle protein abundance varies between X and X, x fold change</a:t>
-            </a:r>
-          </a:p>
-          <a:p>
+              <a:t>p =0.02, R</a:t>
+            </a:r>
+            <a:r>
+              <a:rPr lang="en-AU" baseline="30000" dirty="0" smtClean="0"/>
+              <a:t>2</a:t>
+            </a:r>
+            <a:r>
+              <a:rPr lang="en-AU" dirty="0" smtClean="0"/>
+              <a:t> = </a:t>
+            </a:r>
+            <a:r>
+              <a:rPr lang="en-AU" dirty="0" smtClean="0"/>
+              <a:t>0.16, 8 % increase</a:t>
+            </a:r>
             <a:endParaRPr lang="en-AU" dirty="0"/>
           </a:p>
+        </p:txBody>
+      </p:sp>
+      <p:sp>
+        <p:nvSpPr>
+          <p:cNvPr id="17" name="Title 1"/>
+          <p:cNvSpPr txBox="1">
+            <a:spLocks/>
+          </p:cNvSpPr>
+          <p:nvPr/>
+        </p:nvSpPr>
+        <p:spPr>
+          <a:xfrm>
+            <a:off x="1513490" y="294130"/>
+            <a:ext cx="9616965" cy="1325563"/>
+          </a:xfrm>
+          <a:prstGeom prst="rect">
+            <a:avLst/>
+          </a:prstGeom>
+        </p:spPr>
+        <p:txBody>
+          <a:bodyPr vert="horz" lIns="91440" tIns="45720" rIns="91440" bIns="45720" rtlCol="0" anchor="ctr">
+            <a:normAutofit/>
+          </a:bodyPr>
+          <a:lstStyle>
+            <a:lvl1pPr algn="l" defTabSz="914400" rtl="0" eaLnBrk="1" latinLnBrk="0" hangingPunct="1">
+              <a:lnSpc>
+                <a:spcPct val="90000"/>
+              </a:lnSpc>
+              <a:spcBef>
+                <a:spcPct val="0"/>
+              </a:spcBef>
+              <a:buNone/>
+              <a:defRPr sz="4400" kern="1200">
+                <a:solidFill>
+                  <a:schemeClr val="tx1"/>
+                </a:solidFill>
+                <a:latin typeface="+mj-lt"/>
+                <a:ea typeface="+mj-ea"/>
+                <a:cs typeface="+mj-cs"/>
+              </a:defRPr>
+            </a:lvl1pPr>
+          </a:lstStyle>
+          <a:p>
+            <a:r>
+              <a:rPr lang="en-AU" sz="3200" smtClean="0"/>
+              <a:t>Trends in proportional abundance of Calvin cycle proteins</a:t>
+            </a:r>
+            <a:endParaRPr lang="en-AU" sz="3200" dirty="0"/>
+          </a:p>
+        </p:txBody>
+      </p:sp>
+      <p:sp>
+        <p:nvSpPr>
+          <p:cNvPr id="18" name="TextBox 17"/>
+          <p:cNvSpPr txBox="1"/>
+          <p:nvPr/>
+        </p:nvSpPr>
+        <p:spPr>
+          <a:xfrm>
+            <a:off x="338959" y="4753641"/>
+            <a:ext cx="10612820" cy="646331"/>
+          </a:xfrm>
+          <a:prstGeom prst="rect">
+            <a:avLst/>
+          </a:prstGeom>
+          <a:noFill/>
+        </p:spPr>
+        <p:txBody>
+          <a:bodyPr wrap="square" rtlCol="0">
+            <a:spAutoFit/>
+          </a:bodyPr>
+          <a:lstStyle/>
           <a:p>
             <a:r>
               <a:rPr lang="en-AU" dirty="0" smtClean="0"/>
-              <a:t>Proportional allocation to Calvin cycle proteins not very responsive to environmental conditions</a:t>
-            </a:r>
+              <a:t>Calvin cycle protein proportional abundance varies 1.3-fold, between 0.29 and 0.38 (mean 0.339</a:t>
+            </a:r>
+            <a:r>
+              <a:rPr lang="en-AU" dirty="0"/>
+              <a:t>, </a:t>
+            </a:r>
+            <a:r>
+              <a:rPr lang="en-AU" dirty="0" smtClean="0"/>
+              <a:t>SD = 0.023)</a:t>
+            </a:r>
+            <a:endParaRPr lang="en-AU" dirty="0"/>
+          </a:p>
+          <a:p>
+            <a:r>
+              <a:rPr lang="en-AU" dirty="0" smtClean="0"/>
+              <a:t> </a:t>
+            </a:r>
+            <a:endParaRPr lang="en-AU" dirty="0"/>
           </a:p>
         </p:txBody>
       </p:sp>
@@ -5049,76 +5314,9 @@
           <a:chExt cx="0" cy="0"/>
         </a:xfrm>
       </p:grpSpPr>
-      <p:sp>
-        <p:nvSpPr>
-          <p:cNvPr id="2" name="Title 1"/>
-          <p:cNvSpPr>
-            <a:spLocks noGrp="1"/>
-          </p:cNvSpPr>
-          <p:nvPr>
-            <p:ph type="title"/>
-          </p:nvPr>
-        </p:nvSpPr>
-        <p:spPr>
-          <a:xfrm>
-            <a:off x="3148140" y="294130"/>
-            <a:ext cx="5949099" cy="1325563"/>
-          </a:xfrm>
-        </p:spPr>
-        <p:txBody>
-          <a:bodyPr>
-            <a:normAutofit/>
-          </a:bodyPr>
-          <a:lstStyle/>
-          <a:p>
-            <a:r>
-              <a:rPr lang="en-AU" sz="3200" dirty="0" smtClean="0"/>
-              <a:t>Marginal influence of environment </a:t>
-            </a:r>
-            <a:br>
-              <a:rPr lang="en-AU" sz="3200" dirty="0" smtClean="0"/>
-            </a:br>
-            <a:r>
-              <a:rPr lang="en-AU" sz="3200" dirty="0" smtClean="0"/>
-              <a:t>on investment in Calvin cycle</a:t>
-            </a:r>
-            <a:endParaRPr lang="en-AU" sz="3200" dirty="0"/>
-          </a:p>
-        </p:txBody>
-      </p:sp>
       <p:pic>
         <p:nvPicPr>
           <p:cNvPr id="4" name="Picture 3"/>
-          <p:cNvPicPr>
-            <a:picLocks noChangeAspect="1"/>
-          </p:cNvPicPr>
-          <p:nvPr/>
-        </p:nvPicPr>
-        <p:blipFill>
-          <a:blip r:embed="rId2" cstate="print">
-            <a:extLst>
-              <a:ext uri="{28A0092B-C50C-407E-A947-70E740481C1C}">
-                <a14:useLocalDpi xmlns:a14="http://schemas.microsoft.com/office/drawing/2010/main" val="0"/>
-              </a:ext>
-            </a:extLst>
-          </a:blip>
-          <a:stretch>
-            <a:fillRect/>
-          </a:stretch>
-        </p:blipFill>
-        <p:spPr>
-          <a:xfrm>
-            <a:off x="156751" y="2064486"/>
-            <a:ext cx="3929630" cy="2429028"/>
-          </a:xfrm>
-          <a:prstGeom prst="rect">
-            <a:avLst/>
-          </a:prstGeom>
-        </p:spPr>
-      </p:pic>
-      <p:pic>
-        <p:nvPicPr>
-          <p:cNvPr id="5" name="Picture 4"/>
           <p:cNvPicPr>
             <a:picLocks noChangeAspect="1"/>
           </p:cNvPicPr>
@@ -5138,7 +5336,7 @@
         </p:blipFill>
         <p:spPr>
           <a:xfrm>
-            <a:off x="4157876" y="2064486"/>
+            <a:off x="156751" y="2064486"/>
             <a:ext cx="3929630" cy="2429028"/>
           </a:xfrm>
           <a:prstGeom prst="rect">
@@ -5148,7 +5346,7 @@
       </p:pic>
       <p:pic>
         <p:nvPicPr>
-          <p:cNvPr id="6" name="Picture 5"/>
+          <p:cNvPr id="5" name="Picture 4"/>
           <p:cNvPicPr>
             <a:picLocks noChangeAspect="1"/>
           </p:cNvPicPr>
@@ -5168,7 +5366,7 @@
         </p:blipFill>
         <p:spPr>
           <a:xfrm>
-            <a:off x="8159002" y="2064486"/>
+            <a:off x="4157876" y="2064486"/>
             <a:ext cx="3929630" cy="2429028"/>
           </a:xfrm>
           <a:prstGeom prst="rect">
@@ -5176,153 +5374,9 @@
           </a:prstGeom>
         </p:spPr>
       </p:pic>
-      <p:sp>
-        <p:nvSpPr>
-          <p:cNvPr id="7" name="TextBox 6"/>
-          <p:cNvSpPr txBox="1"/>
-          <p:nvPr/>
-        </p:nvSpPr>
-        <p:spPr>
-          <a:xfrm>
-            <a:off x="838200" y="3591613"/>
-            <a:ext cx="2027548" cy="369332"/>
-          </a:xfrm>
-          <a:prstGeom prst="rect">
-            <a:avLst/>
-          </a:prstGeom>
-          <a:noFill/>
-        </p:spPr>
-        <p:txBody>
-          <a:bodyPr wrap="square" rtlCol="0">
-            <a:spAutoFit/>
-          </a:bodyPr>
-          <a:lstStyle/>
-          <a:p>
-            <a:r>
-              <a:rPr lang="en-AU" dirty="0" smtClean="0"/>
-              <a:t>p = 0.19</a:t>
-            </a:r>
-            <a:endParaRPr lang="en-AU" dirty="0"/>
-          </a:p>
-        </p:txBody>
-      </p:sp>
-      <p:sp>
-        <p:nvSpPr>
-          <p:cNvPr id="8" name="TextBox 7"/>
-          <p:cNvSpPr txBox="1"/>
-          <p:nvPr/>
-        </p:nvSpPr>
-        <p:spPr>
-          <a:xfrm>
-            <a:off x="8550897" y="3591613"/>
-            <a:ext cx="2027548" cy="369332"/>
-          </a:xfrm>
-          <a:prstGeom prst="rect">
-            <a:avLst/>
-          </a:prstGeom>
-          <a:noFill/>
-        </p:spPr>
-        <p:txBody>
-          <a:bodyPr wrap="square" rtlCol="0">
-            <a:spAutoFit/>
-          </a:bodyPr>
-          <a:lstStyle/>
-          <a:p>
-            <a:r>
-              <a:rPr lang="en-AU" dirty="0" smtClean="0"/>
-              <a:t>p = 0.07</a:t>
-            </a:r>
-            <a:endParaRPr lang="en-AU" dirty="0"/>
-          </a:p>
-        </p:txBody>
-      </p:sp>
-      <p:sp>
-        <p:nvSpPr>
-          <p:cNvPr id="9" name="TextBox 8"/>
-          <p:cNvSpPr txBox="1"/>
-          <p:nvPr/>
-        </p:nvSpPr>
-        <p:spPr>
-          <a:xfrm>
-            <a:off x="4489516" y="3591613"/>
-            <a:ext cx="2027548" cy="369332"/>
-          </a:xfrm>
-          <a:prstGeom prst="rect">
-            <a:avLst/>
-          </a:prstGeom>
-          <a:noFill/>
-        </p:spPr>
-        <p:txBody>
-          <a:bodyPr wrap="square" rtlCol="0">
-            <a:spAutoFit/>
-          </a:bodyPr>
-          <a:lstStyle/>
-          <a:p>
-            <a:r>
-              <a:rPr lang="en-AU" b="1" dirty="0" smtClean="0"/>
-              <a:t>p =0.02, R</a:t>
-            </a:r>
-            <a:r>
-              <a:rPr lang="en-AU" b="1" baseline="30000" dirty="0" smtClean="0"/>
-              <a:t>2</a:t>
-            </a:r>
-            <a:r>
-              <a:rPr lang="en-AU" b="1" dirty="0" smtClean="0"/>
-              <a:t> = 0.16</a:t>
-            </a:r>
-            <a:endParaRPr lang="en-AU" b="1" dirty="0"/>
-          </a:p>
-        </p:txBody>
-      </p:sp>
-      <p:sp>
-        <p:nvSpPr>
-          <p:cNvPr id="10" name="Rectangle 9"/>
-          <p:cNvSpPr/>
-          <p:nvPr/>
-        </p:nvSpPr>
-        <p:spPr>
-          <a:xfrm>
-            <a:off x="4131557" y="1951348"/>
-            <a:ext cx="3965376" cy="2542166"/>
-          </a:xfrm>
-          <a:prstGeom prst="rect">
-            <a:avLst/>
-          </a:prstGeom>
-          <a:noFill/>
-          <a:ln w="19050">
-            <a:solidFill>
-              <a:srgbClr val="00B050"/>
-            </a:solidFill>
-          </a:ln>
-        </p:spPr>
-        <p:style>
-          <a:lnRef idx="2">
-            <a:schemeClr val="accent1">
-              <a:shade val="50000"/>
-            </a:schemeClr>
-          </a:lnRef>
-          <a:fillRef idx="1">
-            <a:schemeClr val="accent1"/>
-          </a:fillRef>
-          <a:effectRef idx="0">
-            <a:schemeClr val="accent1"/>
-          </a:effectRef>
-          <a:fontRef idx="minor">
-            <a:schemeClr val="lt1"/>
-          </a:fontRef>
-        </p:style>
-        <p:txBody>
-          <a:bodyPr rtlCol="0" anchor="ctr"/>
-          <a:lstStyle/>
-          <a:p>
-            <a:pPr algn="ctr"/>
-            <a:endParaRPr lang="en-AU"/>
-          </a:p>
-        </p:txBody>
-      </p:sp>
       <p:pic>
         <p:nvPicPr>
-          <p:cNvPr id="11" name="Picture 10"/>
+          <p:cNvPr id="6" name="Picture 5"/>
           <p:cNvPicPr>
             <a:picLocks noChangeAspect="1"/>
           </p:cNvPicPr>
@@ -5342,8 +5396,8 @@
         </p:blipFill>
         <p:spPr>
           <a:xfrm>
-            <a:off x="7463960" y="3591613"/>
-            <a:ext cx="659294" cy="659294"/>
+            <a:off x="8159002" y="2064486"/>
+            <a:ext cx="3929630" cy="2429028"/>
           </a:xfrm>
           <a:prstGeom prst="rect">
             <a:avLst/>
@@ -5352,13 +5406,73 @@
       </p:pic>
       <p:sp>
         <p:nvSpPr>
-          <p:cNvPr id="15" name="Rectangle 14"/>
+          <p:cNvPr id="7" name="TextBox 6"/>
+          <p:cNvSpPr txBox="1"/>
+          <p:nvPr/>
+        </p:nvSpPr>
+        <p:spPr>
+          <a:xfrm>
+            <a:off x="838200" y="3591613"/>
+            <a:ext cx="2027548" cy="369332"/>
+          </a:xfrm>
+          <a:prstGeom prst="rect">
+            <a:avLst/>
+          </a:prstGeom>
+          <a:noFill/>
+        </p:spPr>
+        <p:txBody>
+          <a:bodyPr wrap="square" rtlCol="0">
+            <a:spAutoFit/>
+          </a:bodyPr>
+          <a:lstStyle/>
+          <a:p>
+            <a:r>
+              <a:rPr lang="en-AU" dirty="0" smtClean="0"/>
+              <a:t>p = 0.19</a:t>
+            </a:r>
+            <a:endParaRPr lang="en-AU" dirty="0"/>
+          </a:p>
+        </p:txBody>
+      </p:sp>
+      <p:sp>
+        <p:nvSpPr>
+          <p:cNvPr id="8" name="TextBox 7"/>
+          <p:cNvSpPr txBox="1"/>
+          <p:nvPr/>
+        </p:nvSpPr>
+        <p:spPr>
+          <a:xfrm>
+            <a:off x="8550897" y="3591613"/>
+            <a:ext cx="2027548" cy="369332"/>
+          </a:xfrm>
+          <a:prstGeom prst="rect">
+            <a:avLst/>
+          </a:prstGeom>
+          <a:noFill/>
+        </p:spPr>
+        <p:txBody>
+          <a:bodyPr wrap="square" rtlCol="0">
+            <a:spAutoFit/>
+          </a:bodyPr>
+          <a:lstStyle/>
+          <a:p>
+            <a:r>
+              <a:rPr lang="en-AU" dirty="0" smtClean="0"/>
+              <a:t>p = 0.07</a:t>
+            </a:r>
+            <a:endParaRPr lang="en-AU" dirty="0"/>
+          </a:p>
+        </p:txBody>
+      </p:sp>
+      <p:sp>
+        <p:nvSpPr>
+          <p:cNvPr id="10" name="Rectangle 9"/>
           <p:cNvSpPr/>
           <p:nvPr/>
         </p:nvSpPr>
         <p:spPr>
           <a:xfrm>
-            <a:off x="122966" y="1951348"/>
+            <a:off x="4131557" y="1982878"/>
             <a:ext cx="3965376" cy="2542166"/>
           </a:xfrm>
           <a:prstGeom prst="rect">
@@ -5367,7 +5481,7 @@
           <a:noFill/>
           <a:ln w="19050">
             <a:solidFill>
-              <a:srgbClr val="FF0000"/>
+              <a:srgbClr val="00B050"/>
             </a:solidFill>
           </a:ln>
         </p:spPr>
@@ -5396,15 +5510,45 @@
           </a:p>
         </p:txBody>
       </p:sp>
-      <p:sp>
-        <p:nvSpPr>
-          <p:cNvPr id="16" name="Rectangle 15"/>
+      <p:pic>
+        <p:nvPicPr>
+          <p:cNvPr id="11" name="Picture 10"/>
+          <p:cNvPicPr>
+            <a:picLocks noChangeAspect="1"/>
+          </p:cNvPicPr>
+          <p:nvPr/>
+        </p:nvPicPr>
+        <p:blipFill>
+          <a:blip r:embed="rId6" cstate="print">
+            <a:extLst>
+              <a:ext uri="{28A0092B-C50C-407E-A947-70E740481C1C}">
+                <a14:useLocalDpi xmlns:a14="http://schemas.microsoft.com/office/drawing/2010/main" val="0"/>
+              </a:ext>
+            </a:extLst>
+          </a:blip>
+          <a:stretch>
+            <a:fillRect/>
+          </a:stretch>
+        </p:blipFill>
+        <p:spPr>
+          <a:xfrm>
+            <a:off x="7463960" y="3591613"/>
+            <a:ext cx="659294" cy="659294"/>
+          </a:xfrm>
+          <a:prstGeom prst="rect">
+            <a:avLst/>
+          </a:prstGeom>
+        </p:spPr>
+      </p:pic>
+      <p:sp>
+        <p:nvSpPr>
+          <p:cNvPr id="15" name="Rectangle 14"/>
           <p:cNvSpPr/>
           <p:nvPr/>
         </p:nvSpPr>
         <p:spPr>
           <a:xfrm>
-            <a:off x="8141129" y="1951348"/>
+            <a:off x="122966" y="1982878"/>
             <a:ext cx="3965376" cy="2542166"/>
           </a:xfrm>
           <a:prstGeom prst="rect">
@@ -5439,6 +5583,169 @@
           <a:p>
             <a:pPr algn="ctr"/>
             <a:endParaRPr lang="en-AU"/>
+          </a:p>
+        </p:txBody>
+      </p:sp>
+      <p:sp>
+        <p:nvSpPr>
+          <p:cNvPr id="16" name="Rectangle 15"/>
+          <p:cNvSpPr/>
+          <p:nvPr/>
+        </p:nvSpPr>
+        <p:spPr>
+          <a:xfrm>
+            <a:off x="8141129" y="1982878"/>
+            <a:ext cx="3965376" cy="2542166"/>
+          </a:xfrm>
+          <a:prstGeom prst="rect">
+            <a:avLst/>
+          </a:prstGeom>
+          <a:noFill/>
+          <a:ln w="19050">
+            <a:solidFill>
+              <a:srgbClr val="FF0000"/>
+            </a:solidFill>
+          </a:ln>
+        </p:spPr>
+        <p:style>
+          <a:lnRef idx="2">
+            <a:schemeClr val="accent1">
+              <a:shade val="50000"/>
+            </a:schemeClr>
+          </a:lnRef>
+          <a:fillRef idx="1">
+            <a:schemeClr val="accent1"/>
+          </a:fillRef>
+          <a:effectRef idx="0">
+            <a:schemeClr val="accent1"/>
+          </a:effectRef>
+          <a:fontRef idx="minor">
+            <a:schemeClr val="lt1"/>
+          </a:fontRef>
+        </p:style>
+        <p:txBody>
+          <a:bodyPr rtlCol="0" anchor="ctr"/>
+          <a:lstStyle/>
+          <a:p>
+            <a:pPr algn="ctr"/>
+            <a:endParaRPr lang="en-AU"/>
+          </a:p>
+        </p:txBody>
+      </p:sp>
+      <p:sp>
+        <p:nvSpPr>
+          <p:cNvPr id="19" name="Title 1"/>
+          <p:cNvSpPr>
+            <a:spLocks noGrp="1"/>
+          </p:cNvSpPr>
+          <p:nvPr>
+            <p:ph type="title"/>
+          </p:nvPr>
+        </p:nvSpPr>
+        <p:spPr>
+          <a:xfrm>
+            <a:off x="1513490" y="294130"/>
+            <a:ext cx="9616965" cy="1325563"/>
+          </a:xfrm>
+        </p:spPr>
+        <p:txBody>
+          <a:bodyPr>
+            <a:normAutofit/>
+          </a:bodyPr>
+          <a:lstStyle/>
+          <a:p>
+            <a:r>
+              <a:rPr lang="en-AU" sz="3200" dirty="0" smtClean="0"/>
+              <a:t>Trends in proportional abundance of Calvin cycle proteins</a:t>
+            </a:r>
+            <a:endParaRPr lang="en-AU" sz="3200" dirty="0"/>
+          </a:p>
+        </p:txBody>
+      </p:sp>
+      <p:sp>
+        <p:nvSpPr>
+          <p:cNvPr id="21" name="TextBox 20"/>
+          <p:cNvSpPr txBox="1"/>
+          <p:nvPr/>
+        </p:nvSpPr>
+        <p:spPr>
+          <a:xfrm>
+            <a:off x="4489516" y="3591613"/>
+            <a:ext cx="3256608" cy="369332"/>
+          </a:xfrm>
+          <a:prstGeom prst="rect">
+            <a:avLst/>
+          </a:prstGeom>
+          <a:noFill/>
+        </p:spPr>
+        <p:txBody>
+          <a:bodyPr wrap="square" rtlCol="0">
+            <a:spAutoFit/>
+          </a:bodyPr>
+          <a:lstStyle/>
+          <a:p>
+            <a:r>
+              <a:rPr lang="en-AU" b="1" dirty="0" smtClean="0"/>
+              <a:t>p =0.02, R</a:t>
+            </a:r>
+            <a:r>
+              <a:rPr lang="en-AU" b="1" baseline="30000" dirty="0" smtClean="0"/>
+              <a:t>2</a:t>
+            </a:r>
+            <a:r>
+              <a:rPr lang="en-AU" b="1" dirty="0" smtClean="0"/>
+              <a:t> = </a:t>
+            </a:r>
+            <a:r>
+              <a:rPr lang="en-AU" b="1" dirty="0" smtClean="0"/>
+              <a:t>0.16, 8 % increase</a:t>
+            </a:r>
+            <a:endParaRPr lang="en-AU" b="1" dirty="0"/>
+          </a:p>
+        </p:txBody>
+      </p:sp>
+      <p:sp>
+        <p:nvSpPr>
+          <p:cNvPr id="25" name="TextBox 24"/>
+          <p:cNvSpPr txBox="1"/>
+          <p:nvPr/>
+        </p:nvSpPr>
+        <p:spPr>
+          <a:xfrm>
+            <a:off x="338959" y="4753641"/>
+            <a:ext cx="10612820" cy="646331"/>
+          </a:xfrm>
+          <a:prstGeom prst="rect">
+            <a:avLst/>
+          </a:prstGeom>
+          <a:noFill/>
+        </p:spPr>
+        <p:txBody>
+          <a:bodyPr wrap="square" rtlCol="0">
+            <a:spAutoFit/>
+          </a:bodyPr>
+          <a:lstStyle/>
+          <a:p>
+            <a:r>
+              <a:rPr lang="en-AU" dirty="0" smtClean="0"/>
+              <a:t>Calvin cycle protein proportional abundance varies 1.3-fold, between 0.29 and 0.38 (mean 0.339</a:t>
+            </a:r>
+            <a:r>
+              <a:rPr lang="en-AU" dirty="0"/>
+              <a:t>, </a:t>
+            </a:r>
+            <a:r>
+              <a:rPr lang="en-AU" dirty="0" smtClean="0"/>
+              <a:t>SD = 0.023)</a:t>
+            </a:r>
+            <a:endParaRPr lang="en-AU" dirty="0"/>
+          </a:p>
+          <a:p>
+            <a:r>
+              <a:rPr lang="en-AU" dirty="0" smtClean="0"/>
+              <a:t> </a:t>
+            </a:r>
+            <a:endParaRPr lang="en-AU" dirty="0"/>
           </a:p>
         </p:txBody>
       </p:sp>
@@ -5474,8 +5781,10 @@
       </p:grpSpPr>
       <p:pic>
         <p:nvPicPr>
-          <p:cNvPr id="4" name="Picture 3"/>
-          <p:cNvPicPr/>
+          <p:cNvPr id="2" name="Picture 1"/>
+          <p:cNvPicPr>
+            <a:picLocks noChangeAspect="1"/>
+          </p:cNvPicPr>
           <p:nvPr/>
         </p:nvPicPr>
         <p:blipFill>
@@ -5492,14 +5801,142 @@
         </p:blipFill>
         <p:spPr>
           <a:xfrm>
-            <a:off x="857839" y="881406"/>
-            <a:ext cx="10256363" cy="5095188"/>
+            <a:off x="6537185" y="1829515"/>
+            <a:ext cx="4476248" cy="4476248"/>
           </a:xfrm>
           <a:prstGeom prst="rect">
             <a:avLst/>
           </a:prstGeom>
         </p:spPr>
       </p:pic>
+      <p:pic>
+        <p:nvPicPr>
+          <p:cNvPr id="3" name="Picture 2"/>
+          <p:cNvPicPr>
+            <a:picLocks noChangeAspect="1"/>
+          </p:cNvPicPr>
+          <p:nvPr/>
+        </p:nvPicPr>
+        <p:blipFill>
+          <a:blip r:embed="rId3" cstate="print">
+            <a:extLst>
+              <a:ext uri="{28A0092B-C50C-407E-A947-70E740481C1C}">
+                <a14:useLocalDpi xmlns:a14="http://schemas.microsoft.com/office/drawing/2010/main" val="0"/>
+              </a:ext>
+            </a:extLst>
+          </a:blip>
+          <a:stretch>
+            <a:fillRect/>
+          </a:stretch>
+        </p:blipFill>
+        <p:spPr>
+          <a:xfrm>
+            <a:off x="1050785" y="1829515"/>
+            <a:ext cx="4476248" cy="4476248"/>
+          </a:xfrm>
+          <a:prstGeom prst="rect">
+            <a:avLst/>
+          </a:prstGeom>
+        </p:spPr>
+      </p:pic>
+      <p:sp>
+        <p:nvSpPr>
+          <p:cNvPr id="5" name="TextBox 4"/>
+          <p:cNvSpPr txBox="1"/>
+          <p:nvPr/>
+        </p:nvSpPr>
+        <p:spPr>
+          <a:xfrm>
+            <a:off x="4452377" y="5286053"/>
+            <a:ext cx="1074656" cy="369332"/>
+          </a:xfrm>
+          <a:prstGeom prst="rect">
+            <a:avLst/>
+          </a:prstGeom>
+          <a:noFill/>
+        </p:spPr>
+        <p:txBody>
+          <a:bodyPr wrap="square" rtlCol="0">
+            <a:spAutoFit/>
+          </a:bodyPr>
+          <a:lstStyle/>
+          <a:p>
+            <a:r>
+              <a:rPr lang="en-AU" dirty="0"/>
+              <a:t>r</a:t>
+            </a:r>
+            <a:r>
+              <a:rPr lang="en-AU" dirty="0" smtClean="0"/>
+              <a:t> = 0.83</a:t>
+            </a:r>
+            <a:endParaRPr lang="en-AU" dirty="0"/>
+          </a:p>
+        </p:txBody>
+      </p:sp>
+      <p:sp>
+        <p:nvSpPr>
+          <p:cNvPr id="6" name="TextBox 5"/>
+          <p:cNvSpPr txBox="1"/>
+          <p:nvPr/>
+        </p:nvSpPr>
+        <p:spPr>
+          <a:xfrm>
+            <a:off x="10006335" y="5286053"/>
+            <a:ext cx="1074656" cy="369332"/>
+          </a:xfrm>
+          <a:prstGeom prst="rect">
+            <a:avLst/>
+          </a:prstGeom>
+          <a:noFill/>
+        </p:spPr>
+        <p:txBody>
+          <a:bodyPr wrap="square" rtlCol="0">
+            <a:spAutoFit/>
+          </a:bodyPr>
+          <a:lstStyle/>
+          <a:p>
+            <a:r>
+              <a:rPr lang="en-AU" dirty="0"/>
+              <a:t>r</a:t>
+            </a:r>
+            <a:r>
+              <a:rPr lang="en-AU" dirty="0" smtClean="0"/>
+              <a:t> = 0.94</a:t>
+            </a:r>
+            <a:endParaRPr lang="en-AU" dirty="0"/>
+          </a:p>
+        </p:txBody>
+      </p:sp>
+      <p:sp>
+        <p:nvSpPr>
+          <p:cNvPr id="7" name="TextBox 6"/>
+          <p:cNvSpPr txBox="1"/>
+          <p:nvPr/>
+        </p:nvSpPr>
+        <p:spPr>
+          <a:xfrm>
+            <a:off x="599090" y="336331"/>
+            <a:ext cx="10604938" cy="584775"/>
+          </a:xfrm>
+          <a:prstGeom prst="rect">
+            <a:avLst/>
+          </a:prstGeom>
+          <a:noFill/>
+        </p:spPr>
+        <p:txBody>
+          <a:bodyPr wrap="square" rtlCol="0">
+            <a:spAutoFit/>
+          </a:bodyPr>
+          <a:lstStyle/>
+          <a:p>
+            <a:r>
+              <a:rPr lang="en-AU" sz="3200" dirty="0" smtClean="0"/>
+              <a:t>Variation in allocation to photosystems vs Calvin cycle proteins</a:t>
+            </a:r>
+            <a:endParaRPr lang="en-AU" sz="3200" dirty="0"/>
+          </a:p>
+        </p:txBody>
+      </p:sp>
     </p:spTree>
     <p:extLst>
       <p:ext uri="{BB962C8B-B14F-4D97-AF65-F5344CB8AC3E}">
@@ -5710,66 +6147,6 @@
           <a:chExt cx="0" cy="0"/>
         </a:xfrm>
       </p:grpSpPr>
-      <p:pic>
-        <p:nvPicPr>
-          <p:cNvPr id="14" name="Picture 13"/>
-          <p:cNvPicPr>
-            <a:picLocks noChangeAspect="1"/>
-          </p:cNvPicPr>
-          <p:nvPr/>
-        </p:nvPicPr>
-        <p:blipFill>
-          <a:blip r:embed="rId3" cstate="print">
-            <a:extLst>
-              <a:ext uri="{28A0092B-C50C-407E-A947-70E740481C1C}">
-                <a14:useLocalDpi xmlns:a14="http://schemas.microsoft.com/office/drawing/2010/main" val="0"/>
-              </a:ext>
-            </a:extLst>
-          </a:blip>
-          <a:stretch>
-            <a:fillRect/>
-          </a:stretch>
-        </p:blipFill>
-        <p:spPr>
-          <a:xfrm>
-            <a:off x="6468513" y="1729719"/>
-            <a:ext cx="4242456" cy="4242456"/>
-          </a:xfrm>
-          <a:prstGeom prst="rect">
-            <a:avLst/>
-          </a:prstGeom>
-        </p:spPr>
-      </p:pic>
-      <p:pic>
-        <p:nvPicPr>
-          <p:cNvPr id="15" name="Picture 14"/>
-          <p:cNvPicPr>
-            <a:picLocks noChangeAspect="1"/>
-          </p:cNvPicPr>
-          <p:nvPr/>
-        </p:nvPicPr>
-        <p:blipFill>
-          <a:blip r:embed="rId4" cstate="print">
-            <a:extLst>
-              <a:ext uri="{28A0092B-C50C-407E-A947-70E740481C1C}">
-                <a14:useLocalDpi xmlns:a14="http://schemas.microsoft.com/office/drawing/2010/main" val="0"/>
-              </a:ext>
-            </a:extLst>
-          </a:blip>
-          <a:stretch>
-            <a:fillRect/>
-          </a:stretch>
-        </p:blipFill>
-        <p:spPr>
-          <a:xfrm>
-            <a:off x="1488187" y="1729719"/>
-            <a:ext cx="4242456" cy="4242456"/>
-          </a:xfrm>
-          <a:prstGeom prst="rect">
-            <a:avLst/>
-          </a:prstGeom>
-        </p:spPr>
-      </p:pic>
       <p:sp>
         <p:nvSpPr>
           <p:cNvPr id="2" name="Title 1"/>
@@ -5777,137 +6154,54 @@
             <a:spLocks noGrp="1"/>
           </p:cNvSpPr>
           <p:nvPr>
-            <p:ph type="ctrTitle"/>
-          </p:nvPr>
-        </p:nvSpPr>
-        <p:spPr>
-          <a:xfrm>
-            <a:off x="1074656" y="498248"/>
-            <a:ext cx="10488694" cy="779008"/>
-          </a:xfrm>
-        </p:spPr>
-        <p:txBody>
-          <a:bodyPr>
-            <a:noAutofit/>
-          </a:bodyPr>
-          <a:lstStyle/>
-          <a:p>
-            <a:r>
-              <a:rPr lang="en-AU" sz="3600" dirty="0" smtClean="0"/>
-              <a:t>Protein abundance follows the leaf economic spectrum</a:t>
-            </a:r>
-            <a:endParaRPr lang="en-AU" sz="3600" dirty="0"/>
-          </a:p>
-        </p:txBody>
-      </p:sp>
-      <p:sp>
-        <p:nvSpPr>
-          <p:cNvPr id="11" name="TextBox 10"/>
-          <p:cNvSpPr txBox="1"/>
-          <p:nvPr/>
-        </p:nvSpPr>
-        <p:spPr>
-          <a:xfrm>
-            <a:off x="3597671" y="4680858"/>
-            <a:ext cx="2015413" cy="369332"/>
-          </a:xfrm>
-          <a:prstGeom prst="rect">
-            <a:avLst/>
-          </a:prstGeom>
-          <a:noFill/>
-        </p:spPr>
-        <p:txBody>
-          <a:bodyPr wrap="square" rtlCol="0">
-            <a:spAutoFit/>
-          </a:bodyPr>
+            <p:ph type="title"/>
+          </p:nvPr>
+        </p:nvSpPr>
+        <p:spPr/>
+        <p:txBody>
+          <a:bodyPr/>
           <a:lstStyle/>
           <a:p>
             <a:r>
               <a:rPr lang="en-AU" dirty="0" smtClean="0"/>
-              <a:t>p &lt; 0.001, R</a:t>
-            </a:r>
-            <a:r>
-              <a:rPr lang="en-AU" baseline="30000" dirty="0" smtClean="0"/>
-              <a:t>2</a:t>
-            </a:r>
+              <a:t>Summary</a:t>
+            </a:r>
+            <a:endParaRPr lang="en-AU" dirty="0"/>
+          </a:p>
+        </p:txBody>
+      </p:sp>
+      <p:sp>
+        <p:nvSpPr>
+          <p:cNvPr id="3" name="Content Placeholder 2"/>
+          <p:cNvSpPr>
+            <a:spLocks noGrp="1"/>
+          </p:cNvSpPr>
+          <p:nvPr>
+            <p:ph idx="1"/>
+          </p:nvPr>
+        </p:nvSpPr>
+        <p:spPr/>
+        <p:txBody>
+          <a:bodyPr/>
+          <a:lstStyle/>
+          <a:p>
             <a:r>
               <a:rPr lang="en-AU" dirty="0" smtClean="0"/>
-              <a:t> = 0.86</a:t>
-            </a:r>
-          </a:p>
-        </p:txBody>
-      </p:sp>
-      <p:sp>
-        <p:nvSpPr>
-          <p:cNvPr id="10" name="TextBox 9"/>
-          <p:cNvSpPr txBox="1"/>
-          <p:nvPr/>
-        </p:nvSpPr>
-        <p:spPr>
-          <a:xfrm>
-            <a:off x="8761444" y="4673602"/>
-            <a:ext cx="2206629" cy="369332"/>
-          </a:xfrm>
-          <a:prstGeom prst="rect">
-            <a:avLst/>
-          </a:prstGeom>
-          <a:noFill/>
-        </p:spPr>
-        <p:txBody>
-          <a:bodyPr wrap="square" rtlCol="0">
-            <a:spAutoFit/>
-          </a:bodyPr>
-          <a:lstStyle/>
+              <a:t>Proportional investment in photosystems optimised according to photons / area</a:t>
+            </a:r>
+          </a:p>
           <a:p>
             <a:r>
               <a:rPr lang="en-AU" dirty="0" smtClean="0"/>
-              <a:t>p &lt; 0.001, R</a:t>
-            </a:r>
-            <a:r>
-              <a:rPr lang="en-AU" baseline="30000" dirty="0" smtClean="0"/>
-              <a:t>2</a:t>
-            </a:r>
-            <a:r>
-              <a:rPr lang="en-AU" dirty="0" smtClean="0"/>
-              <a:t> = 0.31</a:t>
-            </a:r>
-          </a:p>
-        </p:txBody>
-      </p:sp>
-      <p:sp>
-        <p:nvSpPr>
-          <p:cNvPr id="16" name="TextBox 15"/>
-          <p:cNvSpPr txBox="1"/>
-          <p:nvPr/>
-        </p:nvSpPr>
-        <p:spPr>
-          <a:xfrm>
-            <a:off x="10506075" y="4171950"/>
-            <a:ext cx="1057275" cy="369332"/>
-          </a:xfrm>
-          <a:prstGeom prst="rect">
-            <a:avLst/>
-          </a:prstGeom>
-          <a:noFill/>
-        </p:spPr>
-        <p:txBody>
-          <a:bodyPr wrap="square" rtlCol="0">
-            <a:spAutoFit/>
-          </a:bodyPr>
-          <a:lstStyle/>
-          <a:p>
-            <a:r>
-              <a:rPr lang="en-AU" dirty="0" smtClean="0"/>
-              <a:t>Slopes?</a:t>
-            </a:r>
-            <a:endParaRPr lang="en-AU" dirty="0"/>
+              <a:t>Proportional abundance of Calvin cycle enzymes not especially variable – total abundance / leaf area matters more and is optimised anatomically by changing leaf thickness</a:t>
+            </a:r>
           </a:p>
         </p:txBody>
       </p:sp>
     </p:spTree>
     <p:extLst>
       <p:ext uri="{BB962C8B-B14F-4D97-AF65-F5344CB8AC3E}">
-        <p14:creationId xmlns:p14="http://schemas.microsoft.com/office/powerpoint/2010/main" val="1650141902"/>
+        <p14:creationId xmlns:p14="http://schemas.microsoft.com/office/powerpoint/2010/main" val="4286063293"/>
       </p:ext>
     </p:extLst>
   </p:cSld>
@@ -5934,62 +6228,9 @@
           <a:chExt cx="0" cy="0"/>
         </a:xfrm>
       </p:grpSpPr>
-      <p:sp>
-        <p:nvSpPr>
-          <p:cNvPr id="2" name="Title 1"/>
-          <p:cNvSpPr>
-            <a:spLocks noGrp="1"/>
-          </p:cNvSpPr>
-          <p:nvPr>
-            <p:ph type="title"/>
-          </p:nvPr>
-        </p:nvSpPr>
-        <p:spPr/>
-        <p:txBody>
-          <a:bodyPr/>
-          <a:lstStyle/>
-          <a:p>
-            <a:r>
-              <a:rPr lang="en-AU" dirty="0" smtClean="0"/>
-              <a:t>LMA trends</a:t>
-            </a:r>
-            <a:endParaRPr lang="en-AU" dirty="0"/>
-          </a:p>
-        </p:txBody>
-      </p:sp>
       <p:pic>
         <p:nvPicPr>
-          <p:cNvPr id="10" name="Picture 9"/>
-          <p:cNvPicPr>
-            <a:picLocks noChangeAspect="1"/>
-          </p:cNvPicPr>
-          <p:nvPr/>
-        </p:nvPicPr>
-        <p:blipFill>
-          <a:blip r:embed="rId2" cstate="print">
-            <a:extLst>
-              <a:ext uri="{28A0092B-C50C-407E-A947-70E740481C1C}">
-                <a14:useLocalDpi xmlns:a14="http://schemas.microsoft.com/office/drawing/2010/main" val="0"/>
-              </a:ext>
-            </a:extLst>
-          </a:blip>
-          <a:stretch>
-            <a:fillRect/>
-          </a:stretch>
-        </p:blipFill>
-        <p:spPr>
-          <a:xfrm>
-            <a:off x="3806464" y="1197241"/>
-            <a:ext cx="2852274" cy="2852274"/>
-          </a:xfrm>
-          <a:prstGeom prst="rect">
-            <a:avLst/>
-          </a:prstGeom>
-        </p:spPr>
-      </p:pic>
-      <p:pic>
-        <p:nvPicPr>
-          <p:cNvPr id="11" name="Picture 10"/>
+          <p:cNvPr id="14" name="Picture 13"/>
           <p:cNvPicPr>
             <a:picLocks noChangeAspect="1"/>
           </p:cNvPicPr>
@@ -6009,84 +6250,54 @@
         </p:blipFill>
         <p:spPr>
           <a:xfrm>
-            <a:off x="6875778" y="1153452"/>
-            <a:ext cx="2852274" cy="2852274"/>
+            <a:off x="539170" y="2152432"/>
+            <a:ext cx="3249886" cy="3249886"/>
           </a:xfrm>
           <a:prstGeom prst="rect">
             <a:avLst/>
           </a:prstGeom>
         </p:spPr>
       </p:pic>
-      <p:pic>
-        <p:nvPicPr>
-          <p:cNvPr id="12" name="Picture 11"/>
-          <p:cNvPicPr>
-            <a:picLocks noChangeAspect="1"/>
-          </p:cNvPicPr>
-          <p:nvPr/>
-        </p:nvPicPr>
-        <p:blipFill>
-          <a:blip r:embed="rId4" cstate="print">
-            <a:extLst>
-              <a:ext uri="{28A0092B-C50C-407E-A947-70E740481C1C}">
-                <a14:useLocalDpi xmlns:a14="http://schemas.microsoft.com/office/drawing/2010/main" val="0"/>
-              </a:ext>
-            </a:extLst>
-          </a:blip>
-          <a:stretch>
-            <a:fillRect/>
-          </a:stretch>
-        </p:blipFill>
-        <p:spPr>
-          <a:xfrm>
-            <a:off x="3736401" y="4049515"/>
-            <a:ext cx="2852274" cy="2852274"/>
-          </a:xfrm>
-          <a:prstGeom prst="rect">
-            <a:avLst/>
-          </a:prstGeom>
-        </p:spPr>
-      </p:pic>
-      <p:pic>
-        <p:nvPicPr>
-          <p:cNvPr id="13" name="Picture 12"/>
-          <p:cNvPicPr>
-            <a:picLocks noChangeAspect="1"/>
-          </p:cNvPicPr>
-          <p:nvPr/>
-        </p:nvPicPr>
-        <p:blipFill>
-          <a:blip r:embed="rId5" cstate="print">
-            <a:extLst>
-              <a:ext uri="{28A0092B-C50C-407E-A947-70E740481C1C}">
-                <a14:useLocalDpi xmlns:a14="http://schemas.microsoft.com/office/drawing/2010/main" val="0"/>
-              </a:ext>
-            </a:extLst>
-          </a:blip>
-          <a:stretch>
-            <a:fillRect/>
-          </a:stretch>
-        </p:blipFill>
-        <p:spPr>
-          <a:xfrm>
-            <a:off x="7146936" y="4005726"/>
-            <a:ext cx="2852274" cy="2852274"/>
-          </a:xfrm>
-          <a:prstGeom prst="rect">
-            <a:avLst/>
-          </a:prstGeom>
-        </p:spPr>
-      </p:pic>
-      <p:sp>
-        <p:nvSpPr>
-          <p:cNvPr id="14" name="TextBox 13"/>
+      <p:sp>
+        <p:nvSpPr>
+          <p:cNvPr id="2" name="Title 1"/>
+          <p:cNvSpPr>
+            <a:spLocks noGrp="1"/>
+          </p:cNvSpPr>
+          <p:nvPr>
+            <p:ph type="ctrTitle"/>
+          </p:nvPr>
+        </p:nvSpPr>
+        <p:spPr>
+          <a:xfrm>
+            <a:off x="1074656" y="498248"/>
+            <a:ext cx="10488694" cy="779008"/>
+          </a:xfrm>
+        </p:spPr>
+        <p:txBody>
+          <a:bodyPr>
+            <a:noAutofit/>
+          </a:bodyPr>
+          <a:lstStyle/>
+          <a:p>
+            <a:r>
+              <a:rPr lang="en-AU" sz="3600" dirty="0" smtClean="0"/>
+              <a:t>Influence of leaf anatomy on protein abundance</a:t>
+            </a:r>
+            <a:endParaRPr lang="en-AU" sz="3600" dirty="0"/>
+          </a:p>
+        </p:txBody>
+      </p:sp>
+      <p:sp>
+        <p:nvSpPr>
+          <p:cNvPr id="10" name="TextBox 9"/>
           <p:cNvSpPr txBox="1"/>
           <p:nvPr/>
         </p:nvSpPr>
         <p:spPr>
           <a:xfrm>
-            <a:off x="4459308" y="6057112"/>
-            <a:ext cx="2129367" cy="369332"/>
+            <a:off x="1514390" y="4274526"/>
+            <a:ext cx="2806060" cy="276999"/>
           </a:xfrm>
           <a:prstGeom prst="rect">
             <a:avLst/>
@@ -6100,35 +6311,30 @@
           <a:lstStyle/>
           <a:p>
             <a:r>
-              <a:rPr lang="en-AU" dirty="0" smtClean="0"/>
-              <a:t>p </a:t>
-            </a:r>
-            <a:r>
-              <a:rPr lang="en-AU" dirty="0"/>
-              <a:t>= 0.01, R</a:t>
-            </a:r>
-            <a:r>
-              <a:rPr lang="en-AU" baseline="30000" dirty="0"/>
+              <a:rPr lang="en-AU" sz="1200" dirty="0" smtClean="0"/>
+              <a:t>p &lt; 0.001, R</a:t>
+            </a:r>
+            <a:r>
+              <a:rPr lang="en-AU" sz="1200" baseline="30000" dirty="0" smtClean="0"/>
               <a:t>2</a:t>
             </a:r>
             <a:r>
-              <a:rPr lang="en-AU" dirty="0"/>
-              <a:t> = 0.20 </a:t>
-            </a:r>
-            <a:endParaRPr lang="en-AU" dirty="0"/>
-          </a:p>
-        </p:txBody>
-      </p:sp>
-      <p:sp>
-        <p:nvSpPr>
-          <p:cNvPr id="15" name="TextBox 14"/>
+              <a:rPr lang="en-AU" sz="1200" dirty="0" smtClean="0"/>
+              <a:t> = 0.31</a:t>
+            </a:r>
+          </a:p>
+        </p:txBody>
+      </p:sp>
+      <p:sp>
+        <p:nvSpPr>
+          <p:cNvPr id="3" name="TextBox 2"/>
           <p:cNvSpPr txBox="1"/>
           <p:nvPr/>
         </p:nvSpPr>
         <p:spPr>
           <a:xfrm>
-            <a:off x="8503010" y="6136098"/>
-            <a:ext cx="1687398" cy="369332"/>
+            <a:off x="4424855" y="2150243"/>
+            <a:ext cx="6642538" cy="646331"/>
           </a:xfrm>
           <a:prstGeom prst="rect">
             <a:avLst/>
@@ -6141,89 +6347,23 @@
           </a:bodyPr>
           <a:lstStyle/>
           <a:p>
+            <a:pPr marL="285750" indent="-285750">
+              <a:buFont typeface="Arial" panose="020B0604020202020204" pitchFamily="34" charset="0"/>
+              <a:buChar char="•"/>
+            </a:pPr>
             <a:r>
               <a:rPr lang="en-AU" dirty="0" smtClean="0"/>
-              <a:t>p </a:t>
-            </a:r>
-            <a:r>
-              <a:rPr lang="en-AU" dirty="0"/>
-              <a:t>= 0.15</a:t>
-            </a:r>
-            <a:endParaRPr lang="en-AU" dirty="0"/>
-          </a:p>
-        </p:txBody>
-      </p:sp>
-      <p:sp>
-        <p:nvSpPr>
-          <p:cNvPr id="16" name="TextBox 15"/>
-          <p:cNvSpPr txBox="1"/>
-          <p:nvPr/>
-        </p:nvSpPr>
-        <p:spPr>
-          <a:xfrm>
-            <a:off x="4980389" y="3283824"/>
-            <a:ext cx="1687398" cy="369332"/>
-          </a:xfrm>
-          <a:prstGeom prst="rect">
-            <a:avLst/>
-          </a:prstGeom>
-          <a:noFill/>
-        </p:spPr>
-        <p:txBody>
-          <a:bodyPr wrap="square" rtlCol="0">
-            <a:spAutoFit/>
-          </a:bodyPr>
-          <a:lstStyle/>
-          <a:p>
+              <a:t>Leaf mass per area (LMA) quantifies investment in leaves</a:t>
+            </a:r>
+          </a:p>
+          <a:p>
+            <a:pPr marL="285750" indent="-285750">
+              <a:buFont typeface="Arial" panose="020B0604020202020204" pitchFamily="34" charset="0"/>
+              <a:buChar char="•"/>
+            </a:pPr>
             <a:r>
               <a:rPr lang="en-AU" dirty="0" smtClean="0"/>
-              <a:t>p = 0.88</a:t>
-            </a:r>
-            <a:endParaRPr lang="en-AU" dirty="0"/>
-          </a:p>
-        </p:txBody>
-      </p:sp>
-      <p:sp>
-        <p:nvSpPr>
-          <p:cNvPr id="17" name="TextBox 16"/>
-          <p:cNvSpPr txBox="1"/>
-          <p:nvPr/>
-        </p:nvSpPr>
-        <p:spPr>
-          <a:xfrm>
-            <a:off x="7829529" y="3283824"/>
-            <a:ext cx="2001657" cy="369332"/>
-          </a:xfrm>
-          <a:prstGeom prst="rect">
-            <a:avLst/>
-          </a:prstGeom>
-          <a:noFill/>
-        </p:spPr>
-        <p:txBody>
-          <a:bodyPr wrap="square" rtlCol="0">
-            <a:spAutoFit/>
-          </a:bodyPr>
-          <a:lstStyle/>
-          <a:p>
-            <a:r>
-              <a:rPr lang="en-AU" dirty="0" smtClean="0"/>
-              <a:t>p &lt; 0.001, </a:t>
-            </a:r>
-            <a:r>
-              <a:rPr lang="en-AU" dirty="0"/>
-              <a:t>R</a:t>
-            </a:r>
-            <a:r>
-              <a:rPr lang="en-AU" baseline="30000" dirty="0"/>
-              <a:t>2</a:t>
-            </a:r>
-            <a:r>
-              <a:rPr lang="en-AU" dirty="0"/>
-              <a:t> </a:t>
-            </a:r>
-            <a:r>
-              <a:rPr lang="en-AU" dirty="0" smtClean="0"/>
-              <a:t>= 0.26 </a:t>
+              <a:t>Higher LMA leaves are better defended and live longer, </a:t>
             </a:r>
             <a:endParaRPr lang="en-AU" dirty="0"/>
           </a:p>
@@ -6232,7 +6372,7 @@
     </p:spTree>
     <p:extLst>
       <p:ext uri="{BB962C8B-B14F-4D97-AF65-F5344CB8AC3E}">
-        <p14:creationId xmlns:p14="http://schemas.microsoft.com/office/powerpoint/2010/main" val="2424751076"/>
+        <p14:creationId xmlns:p14="http://schemas.microsoft.com/office/powerpoint/2010/main" val="1650141902"/>
       </p:ext>
     </p:extLst>
   </p:cSld>
@@ -6276,44 +6416,286 @@
           <a:p>
             <a:r>
               <a:rPr lang="en-AU" dirty="0" smtClean="0"/>
-              <a:t>Summary</a:t>
+              <a:t>LMA trends</a:t>
             </a:r>
             <a:endParaRPr lang="en-AU" dirty="0"/>
           </a:p>
         </p:txBody>
       </p:sp>
-      <p:sp>
-        <p:nvSpPr>
-          <p:cNvPr id="3" name="Content Placeholder 2"/>
-          <p:cNvSpPr>
-            <a:spLocks noGrp="1"/>
-          </p:cNvSpPr>
-          <p:nvPr>
-            <p:ph idx="1"/>
-          </p:nvPr>
-        </p:nvSpPr>
-        <p:spPr/>
-        <p:txBody>
-          <a:bodyPr/>
+      <p:pic>
+        <p:nvPicPr>
+          <p:cNvPr id="10" name="Picture 9"/>
+          <p:cNvPicPr>
+            <a:picLocks noChangeAspect="1"/>
+          </p:cNvPicPr>
+          <p:nvPr/>
+        </p:nvPicPr>
+        <p:blipFill>
+          <a:blip r:embed="rId3" cstate="print">
+            <a:extLst>
+              <a:ext uri="{28A0092B-C50C-407E-A947-70E740481C1C}">
+                <a14:useLocalDpi xmlns:a14="http://schemas.microsoft.com/office/drawing/2010/main" val="0"/>
+              </a:ext>
+            </a:extLst>
+          </a:blip>
+          <a:stretch>
+            <a:fillRect/>
+          </a:stretch>
+        </p:blipFill>
+        <p:spPr>
+          <a:xfrm>
+            <a:off x="3806464" y="1197241"/>
+            <a:ext cx="2852274" cy="2852274"/>
+          </a:xfrm>
+          <a:prstGeom prst="rect">
+            <a:avLst/>
+          </a:prstGeom>
+        </p:spPr>
+      </p:pic>
+      <p:pic>
+        <p:nvPicPr>
+          <p:cNvPr id="11" name="Picture 10"/>
+          <p:cNvPicPr>
+            <a:picLocks noChangeAspect="1"/>
+          </p:cNvPicPr>
+          <p:nvPr/>
+        </p:nvPicPr>
+        <p:blipFill>
+          <a:blip r:embed="rId4" cstate="print">
+            <a:extLst>
+              <a:ext uri="{28A0092B-C50C-407E-A947-70E740481C1C}">
+                <a14:useLocalDpi xmlns:a14="http://schemas.microsoft.com/office/drawing/2010/main" val="0"/>
+              </a:ext>
+            </a:extLst>
+          </a:blip>
+          <a:stretch>
+            <a:fillRect/>
+          </a:stretch>
+        </p:blipFill>
+        <p:spPr>
+          <a:xfrm>
+            <a:off x="6875778" y="1153452"/>
+            <a:ext cx="2852274" cy="2852274"/>
+          </a:xfrm>
+          <a:prstGeom prst="rect">
+            <a:avLst/>
+          </a:prstGeom>
+        </p:spPr>
+      </p:pic>
+      <p:pic>
+        <p:nvPicPr>
+          <p:cNvPr id="12" name="Picture 11"/>
+          <p:cNvPicPr>
+            <a:picLocks noChangeAspect="1"/>
+          </p:cNvPicPr>
+          <p:nvPr/>
+        </p:nvPicPr>
+        <p:blipFill>
+          <a:blip r:embed="rId5" cstate="print">
+            <a:extLst>
+              <a:ext uri="{28A0092B-C50C-407E-A947-70E740481C1C}">
+                <a14:useLocalDpi xmlns:a14="http://schemas.microsoft.com/office/drawing/2010/main" val="0"/>
+              </a:ext>
+            </a:extLst>
+          </a:blip>
+          <a:stretch>
+            <a:fillRect/>
+          </a:stretch>
+        </p:blipFill>
+        <p:spPr>
+          <a:xfrm>
+            <a:off x="3736401" y="4049515"/>
+            <a:ext cx="2852274" cy="2852274"/>
+          </a:xfrm>
+          <a:prstGeom prst="rect">
+            <a:avLst/>
+          </a:prstGeom>
+        </p:spPr>
+      </p:pic>
+      <p:pic>
+        <p:nvPicPr>
+          <p:cNvPr id="13" name="Picture 12"/>
+          <p:cNvPicPr>
+            <a:picLocks noChangeAspect="1"/>
+          </p:cNvPicPr>
+          <p:nvPr/>
+        </p:nvPicPr>
+        <p:blipFill>
+          <a:blip r:embed="rId6" cstate="print">
+            <a:extLst>
+              <a:ext uri="{28A0092B-C50C-407E-A947-70E740481C1C}">
+                <a14:useLocalDpi xmlns:a14="http://schemas.microsoft.com/office/drawing/2010/main" val="0"/>
+              </a:ext>
+            </a:extLst>
+          </a:blip>
+          <a:stretch>
+            <a:fillRect/>
+          </a:stretch>
+        </p:blipFill>
+        <p:spPr>
+          <a:xfrm>
+            <a:off x="7146936" y="4005726"/>
+            <a:ext cx="2852274" cy="2852274"/>
+          </a:xfrm>
+          <a:prstGeom prst="rect">
+            <a:avLst/>
+          </a:prstGeom>
+        </p:spPr>
+      </p:pic>
+      <p:sp>
+        <p:nvSpPr>
+          <p:cNvPr id="14" name="TextBox 13"/>
+          <p:cNvSpPr txBox="1"/>
+          <p:nvPr/>
+        </p:nvSpPr>
+        <p:spPr>
+          <a:xfrm>
+            <a:off x="4459308" y="6057112"/>
+            <a:ext cx="2129367" cy="369332"/>
+          </a:xfrm>
+          <a:prstGeom prst="rect">
+            <a:avLst/>
+          </a:prstGeom>
+          <a:noFill/>
+        </p:spPr>
+        <p:txBody>
+          <a:bodyPr wrap="square" rtlCol="0">
+            <a:spAutoFit/>
+          </a:bodyPr>
           <a:lstStyle/>
           <a:p>
             <a:r>
               <a:rPr lang="en-AU" dirty="0" smtClean="0"/>
-              <a:t>Proportional investment in photosystems optimised according to photons / area</a:t>
-            </a:r>
-          </a:p>
+              <a:t>p </a:t>
+            </a:r>
+            <a:r>
+              <a:rPr lang="en-AU" dirty="0"/>
+              <a:t>= 0.01, R</a:t>
+            </a:r>
+            <a:r>
+              <a:rPr lang="en-AU" baseline="30000" dirty="0"/>
+              <a:t>2</a:t>
+            </a:r>
+            <a:r>
+              <a:rPr lang="en-AU" dirty="0"/>
+              <a:t> = 0.20 </a:t>
+            </a:r>
+          </a:p>
+        </p:txBody>
+      </p:sp>
+      <p:sp>
+        <p:nvSpPr>
+          <p:cNvPr id="15" name="TextBox 14"/>
+          <p:cNvSpPr txBox="1"/>
+          <p:nvPr/>
+        </p:nvSpPr>
+        <p:spPr>
+          <a:xfrm>
+            <a:off x="8503010" y="6136098"/>
+            <a:ext cx="1687398" cy="369332"/>
+          </a:xfrm>
+          <a:prstGeom prst="rect">
+            <a:avLst/>
+          </a:prstGeom>
+          <a:noFill/>
+        </p:spPr>
+        <p:txBody>
+          <a:bodyPr wrap="square" rtlCol="0">
+            <a:spAutoFit/>
+          </a:bodyPr>
+          <a:lstStyle/>
           <a:p>
             <a:r>
               <a:rPr lang="en-AU" dirty="0" smtClean="0"/>
-              <a:t>Proportional abundance of Calvin cycle enzymes not especially variable – total abundance / leaf area matters more and is optimised anatomically by changing leaf thickness</a:t>
-            </a:r>
+              <a:t>p </a:t>
+            </a:r>
+            <a:r>
+              <a:rPr lang="en-AU" dirty="0"/>
+              <a:t>= 0.15</a:t>
+            </a:r>
+          </a:p>
+        </p:txBody>
+      </p:sp>
+      <p:sp>
+        <p:nvSpPr>
+          <p:cNvPr id="16" name="TextBox 15"/>
+          <p:cNvSpPr txBox="1"/>
+          <p:nvPr/>
+        </p:nvSpPr>
+        <p:spPr>
+          <a:xfrm>
+            <a:off x="4980389" y="3283824"/>
+            <a:ext cx="1687398" cy="369332"/>
+          </a:xfrm>
+          <a:prstGeom prst="rect">
+            <a:avLst/>
+          </a:prstGeom>
+          <a:noFill/>
+        </p:spPr>
+        <p:txBody>
+          <a:bodyPr wrap="square" rtlCol="0">
+            <a:spAutoFit/>
+          </a:bodyPr>
+          <a:lstStyle/>
+          <a:p>
+            <a:r>
+              <a:rPr lang="en-AU" dirty="0" smtClean="0"/>
+              <a:t>p = 0.88</a:t>
+            </a:r>
+            <a:endParaRPr lang="en-AU" dirty="0"/>
+          </a:p>
+        </p:txBody>
+      </p:sp>
+      <p:sp>
+        <p:nvSpPr>
+          <p:cNvPr id="17" name="TextBox 16"/>
+          <p:cNvSpPr txBox="1"/>
+          <p:nvPr/>
+        </p:nvSpPr>
+        <p:spPr>
+          <a:xfrm>
+            <a:off x="7829529" y="3283824"/>
+            <a:ext cx="2001657" cy="369332"/>
+          </a:xfrm>
+          <a:prstGeom prst="rect">
+            <a:avLst/>
+          </a:prstGeom>
+          <a:noFill/>
+        </p:spPr>
+        <p:txBody>
+          <a:bodyPr wrap="square" rtlCol="0">
+            <a:spAutoFit/>
+          </a:bodyPr>
+          <a:lstStyle/>
+          <a:p>
+            <a:r>
+              <a:rPr lang="en-AU" dirty="0" smtClean="0"/>
+              <a:t>p &lt; 0.001, </a:t>
+            </a:r>
+            <a:r>
+              <a:rPr lang="en-AU" dirty="0"/>
+              <a:t>R</a:t>
+            </a:r>
+            <a:r>
+              <a:rPr lang="en-AU" baseline="30000" dirty="0"/>
+              <a:t>2</a:t>
+            </a:r>
+            <a:r>
+              <a:rPr lang="en-AU" dirty="0"/>
+              <a:t> </a:t>
+            </a:r>
+            <a:r>
+              <a:rPr lang="en-AU" dirty="0" smtClean="0"/>
+              <a:t>= 0.26 </a:t>
+            </a:r>
+            <a:endParaRPr lang="en-AU" dirty="0"/>
           </a:p>
         </p:txBody>
       </p:sp>
     </p:spTree>
     <p:extLst>
       <p:ext uri="{BB962C8B-B14F-4D97-AF65-F5344CB8AC3E}">
-        <p14:creationId xmlns:p14="http://schemas.microsoft.com/office/powerpoint/2010/main" val="4286063293"/>
+        <p14:creationId xmlns:p14="http://schemas.microsoft.com/office/powerpoint/2010/main" val="2424751076"/>
       </p:ext>
     </p:extLst>
   </p:cSld>
@@ -6443,11 +6825,7 @@
           <a:p>
             <a:r>
               <a:rPr lang="en-AU" dirty="0" smtClean="0"/>
-              <a:t>Environmental </a:t>
-            </a:r>
-            <a:r>
-              <a:rPr lang="en-AU" dirty="0" smtClean="0"/>
-              <a:t>trends in leaf protein abundance</a:t>
+              <a:t>Environmental trends in leaf protein abundance</a:t>
             </a:r>
             <a:endParaRPr lang="en-AU" dirty="0"/>
           </a:p>
@@ -6751,55 +7129,9 @@
           <a:chExt cx="0" cy="0"/>
         </a:xfrm>
       </p:grpSpPr>
-      <p:sp>
-        <p:nvSpPr>
-          <p:cNvPr id="11" name="TextBox 10"/>
-          <p:cNvSpPr txBox="1"/>
-          <p:nvPr/>
-        </p:nvSpPr>
-        <p:spPr>
-          <a:xfrm>
-            <a:off x="107360" y="6323934"/>
-            <a:ext cx="6991024" cy="369332"/>
-          </a:xfrm>
-          <a:prstGeom prst="rect">
-            <a:avLst/>
-          </a:prstGeom>
-          <a:noFill/>
-        </p:spPr>
-        <p:txBody>
-          <a:bodyPr wrap="square" rtlCol="0">
-            <a:spAutoFit/>
-          </a:bodyPr>
-          <a:lstStyle/>
-          <a:p>
-            <a:r>
-              <a:rPr lang="en-AU" dirty="0" smtClean="0"/>
-              <a:t>Total p</a:t>
-            </a:r>
-            <a:r>
-              <a:rPr lang="en-AU" dirty="0" smtClean="0"/>
-              <a:t>rotein content ranges between </a:t>
-            </a:r>
-            <a:r>
-              <a:rPr lang="en-AU" dirty="0" smtClean="0"/>
-              <a:t>2 and 27</a:t>
-            </a:r>
-            <a:r>
-              <a:rPr lang="en-AU" dirty="0"/>
-              <a:t>% </a:t>
-            </a:r>
-            <a:r>
-              <a:rPr lang="en-AU" dirty="0" smtClean="0"/>
-              <a:t>(mean 11%, SD 4%)</a:t>
-            </a:r>
-            <a:endParaRPr lang="en-AU" dirty="0"/>
-          </a:p>
-        </p:txBody>
-      </p:sp>
       <p:pic>
         <p:nvPicPr>
-          <p:cNvPr id="12" name="Picture 11"/>
+          <p:cNvPr id="5" name="Picture 4"/>
           <p:cNvPicPr>
             <a:picLocks noChangeAspect="1"/>
           </p:cNvPicPr>
@@ -6819,8 +7151,8 @@
         </p:blipFill>
         <p:spPr>
           <a:xfrm>
-            <a:off x="1633979" y="665756"/>
-            <a:ext cx="8924042" cy="5526488"/>
+            <a:off x="639864" y="1586513"/>
+            <a:ext cx="3273414" cy="4701166"/>
           </a:xfrm>
           <a:prstGeom prst="rect">
             <a:avLst/>
@@ -6829,14 +7161,93 @@
       </p:pic>
       <p:sp>
         <p:nvSpPr>
-          <p:cNvPr id="13" name="TextBox 12"/>
+          <p:cNvPr id="6" name="Title 1"/>
+          <p:cNvSpPr txBox="1">
+            <a:spLocks/>
+          </p:cNvSpPr>
+          <p:nvPr/>
+        </p:nvSpPr>
+        <p:spPr>
+          <a:xfrm>
+            <a:off x="1524000" y="498248"/>
+            <a:ext cx="9231086" cy="779008"/>
+          </a:xfrm>
+          <a:prstGeom prst="rect">
+            <a:avLst/>
+          </a:prstGeom>
+        </p:spPr>
+        <p:txBody>
+          <a:bodyPr vert="horz" lIns="91440" tIns="45720" rIns="91440" bIns="45720" rtlCol="0" anchor="ctr">
+            <a:normAutofit fontScale="82500" lnSpcReduction="10000"/>
+          </a:bodyPr>
+          <a:lstStyle>
+            <a:lvl1pPr algn="l" defTabSz="914400" rtl="0" eaLnBrk="1" latinLnBrk="0" hangingPunct="1">
+              <a:lnSpc>
+                <a:spcPct val="90000"/>
+              </a:lnSpc>
+              <a:spcBef>
+                <a:spcPct val="0"/>
+              </a:spcBef>
+              <a:buNone/>
+              <a:defRPr sz="4400" kern="1200">
+                <a:solidFill>
+                  <a:schemeClr val="tx1"/>
+                </a:solidFill>
+                <a:latin typeface="+mj-lt"/>
+                <a:ea typeface="+mj-ea"/>
+                <a:cs typeface="+mj-cs"/>
+              </a:defRPr>
+            </a:lvl1pPr>
+          </a:lstStyle>
+          <a:p>
+            <a:r>
+              <a:rPr lang="en-AU" dirty="0" smtClean="0"/>
+              <a:t>Environmental trends in leaf protein abundance</a:t>
+            </a:r>
+            <a:endParaRPr lang="en-AU" dirty="0"/>
+          </a:p>
+        </p:txBody>
+      </p:sp>
+      <p:pic>
+        <p:nvPicPr>
+          <p:cNvPr id="7" name="Picture 6"/>
+          <p:cNvPicPr>
+            <a:picLocks noChangeAspect="1"/>
+          </p:cNvPicPr>
+          <p:nvPr/>
+        </p:nvPicPr>
+        <p:blipFill>
+          <a:blip r:embed="rId4" cstate="print">
+            <a:extLst>
+              <a:ext uri="{28A0092B-C50C-407E-A947-70E740481C1C}">
+                <a14:useLocalDpi xmlns:a14="http://schemas.microsoft.com/office/drawing/2010/main" val="0"/>
+              </a:ext>
+            </a:extLst>
+          </a:blip>
+          <a:stretch>
+            <a:fillRect/>
+          </a:stretch>
+        </p:blipFill>
+        <p:spPr>
+          <a:xfrm>
+            <a:off x="4445876" y="1191755"/>
+            <a:ext cx="6890462" cy="4881620"/>
+          </a:xfrm>
+          <a:prstGeom prst="rect">
+            <a:avLst/>
+          </a:prstGeom>
+        </p:spPr>
+      </p:pic>
+      <p:sp>
+        <p:nvSpPr>
+          <p:cNvPr id="2" name="TextBox 1"/>
           <p:cNvSpPr txBox="1"/>
           <p:nvPr/>
         </p:nvSpPr>
         <p:spPr>
           <a:xfrm>
-            <a:off x="546755" y="263951"/>
-            <a:ext cx="4675694" cy="646331"/>
+            <a:off x="4550979" y="6020825"/>
+            <a:ext cx="7241628" cy="646331"/>
           </a:xfrm>
           <a:prstGeom prst="rect">
             <a:avLst/>
@@ -6850,17 +7261,21 @@
           <a:lstStyle/>
           <a:p>
             <a:r>
-              <a:rPr lang="en-AU" sz="3600" dirty="0" smtClean="0"/>
-              <a:t>What’s in a leaf?</a:t>
-            </a:r>
-            <a:endParaRPr lang="en-AU" sz="3600" dirty="0"/>
+              <a:rPr lang="en-AU" b="1" i="1" dirty="0" smtClean="0"/>
+              <a:t>Co-ordination hypothesis</a:t>
+            </a:r>
+            <a:r>
+              <a:rPr lang="en-AU" dirty="0" smtClean="0"/>
+              <a:t>: leaves should optimise protein allocation so that photosynthesis is co-limited by light capture and carboxylation capacity</a:t>
+            </a:r>
+            <a:endParaRPr lang="en-AU" dirty="0"/>
           </a:p>
         </p:txBody>
       </p:sp>
     </p:spTree>
     <p:extLst>
       <p:ext uri="{BB962C8B-B14F-4D97-AF65-F5344CB8AC3E}">
-        <p14:creationId xmlns:p14="http://schemas.microsoft.com/office/powerpoint/2010/main" val="4224053659"/>
+        <p14:creationId xmlns:p14="http://schemas.microsoft.com/office/powerpoint/2010/main" val="3423496217"/>
       </p:ext>
     </p:extLst>
   </p:cSld>
@@ -7781,149 +8196,6 @@
         </p:blipFill>
         <p:spPr>
           <a:xfrm>
-            <a:off x="639864" y="1586513"/>
-            <a:ext cx="3273414" cy="4701166"/>
-          </a:xfrm>
-          <a:prstGeom prst="rect">
-            <a:avLst/>
-          </a:prstGeom>
-        </p:spPr>
-      </p:pic>
-      <p:sp>
-        <p:nvSpPr>
-          <p:cNvPr id="6" name="Title 1"/>
-          <p:cNvSpPr txBox="1">
-            <a:spLocks/>
-          </p:cNvSpPr>
-          <p:nvPr/>
-        </p:nvSpPr>
-        <p:spPr>
-          <a:xfrm>
-            <a:off x="1524000" y="498248"/>
-            <a:ext cx="9231086" cy="779008"/>
-          </a:xfrm>
-          <a:prstGeom prst="rect">
-            <a:avLst/>
-          </a:prstGeom>
-        </p:spPr>
-        <p:txBody>
-          <a:bodyPr vert="horz" lIns="91440" tIns="45720" rIns="91440" bIns="45720" rtlCol="0" anchor="ctr">
-            <a:normAutofit fontScale="82500" lnSpcReduction="10000"/>
-          </a:bodyPr>
-          <a:lstStyle>
-            <a:lvl1pPr algn="l" defTabSz="914400" rtl="0" eaLnBrk="1" latinLnBrk="0" hangingPunct="1">
-              <a:lnSpc>
-                <a:spcPct val="90000"/>
-              </a:lnSpc>
-              <a:spcBef>
-                <a:spcPct val="0"/>
-              </a:spcBef>
-              <a:buNone/>
-              <a:defRPr sz="4400" kern="1200">
-                <a:solidFill>
-                  <a:schemeClr val="tx1"/>
-                </a:solidFill>
-                <a:latin typeface="+mj-lt"/>
-                <a:ea typeface="+mj-ea"/>
-                <a:cs typeface="+mj-cs"/>
-              </a:defRPr>
-            </a:lvl1pPr>
-          </a:lstStyle>
-          <a:p>
-            <a:r>
-              <a:rPr lang="en-AU" dirty="0" smtClean="0"/>
-              <a:t>Environmental </a:t>
-            </a:r>
-            <a:r>
-              <a:rPr lang="en-AU" dirty="0" smtClean="0"/>
-              <a:t>trends in leaf protein abundance</a:t>
-            </a:r>
-            <a:endParaRPr lang="en-AU" dirty="0"/>
-          </a:p>
-        </p:txBody>
-      </p:sp>
-      <p:pic>
-        <p:nvPicPr>
-          <p:cNvPr id="7" name="Picture 6"/>
-          <p:cNvPicPr>
-            <a:picLocks noChangeAspect="1"/>
-          </p:cNvPicPr>
-          <p:nvPr/>
-        </p:nvPicPr>
-        <p:blipFill>
-          <a:blip r:embed="rId4" cstate="print">
-            <a:extLst>
-              <a:ext uri="{28A0092B-C50C-407E-A947-70E740481C1C}">
-                <a14:useLocalDpi xmlns:a14="http://schemas.microsoft.com/office/drawing/2010/main" val="0"/>
-              </a:ext>
-            </a:extLst>
-          </a:blip>
-          <a:stretch>
-            <a:fillRect/>
-          </a:stretch>
-        </p:blipFill>
-        <p:spPr>
-          <a:xfrm>
-            <a:off x="4028394" y="1216110"/>
-            <a:ext cx="7830528" cy="5547620"/>
-          </a:xfrm>
-          <a:prstGeom prst="rect">
-            <a:avLst/>
-          </a:prstGeom>
-        </p:spPr>
-      </p:pic>
-    </p:spTree>
-    <p:extLst>
-      <p:ext uri="{BB962C8B-B14F-4D97-AF65-F5344CB8AC3E}">
-        <p14:creationId xmlns:p14="http://schemas.microsoft.com/office/powerpoint/2010/main" val="3423496217"/>
-      </p:ext>
-    </p:extLst>
-  </p:cSld>
-  <p:clrMapOvr>
-    <a:masterClrMapping/>
-  </p:clrMapOvr>
-</p:sld>
-</file>
-
-<file path=ppt/slides/slide4.xml><?xml version="1.0" encoding="utf-8"?>
-<p:sld xmlns:a="http://schemas.openxmlformats.org/drawingml/2006/main" xmlns:r="http://schemas.openxmlformats.org/officeDocument/2006/relationships" xmlns:p="http://schemas.openxmlformats.org/presentationml/2006/main">
-  <p:cSld>
-    <p:spTree>
-      <p:nvGrpSpPr>
-        <p:cNvPr id="1" name=""/>
-        <p:cNvGrpSpPr/>
-        <p:nvPr/>
-      </p:nvGrpSpPr>
-      <p:grpSpPr>
-        <a:xfrm>
-          <a:off x="0" y="0"/>
-          <a:ext cx="0" cy="0"/>
-          <a:chOff x="0" y="0"/>
-          <a:chExt cx="0" cy="0"/>
-        </a:xfrm>
-      </p:grpSpPr>
-      <p:pic>
-        <p:nvPicPr>
-          <p:cNvPr id="5" name="Picture 4"/>
-          <p:cNvPicPr>
-            <a:picLocks noChangeAspect="1"/>
-          </p:cNvPicPr>
-          <p:nvPr/>
-        </p:nvPicPr>
-        <p:blipFill>
-          <a:blip r:embed="rId3" cstate="print">
-            <a:extLst>
-              <a:ext uri="{28A0092B-C50C-407E-A947-70E740481C1C}">
-                <a14:useLocalDpi xmlns:a14="http://schemas.microsoft.com/office/drawing/2010/main" val="0"/>
-              </a:ext>
-            </a:extLst>
-          </a:blip>
-          <a:stretch>
-            <a:fillRect/>
-          </a:stretch>
-        </p:blipFill>
-        <p:spPr>
-          <a:xfrm>
             <a:off x="607638" y="2117347"/>
             <a:ext cx="5344822" cy="3303804"/>
           </a:xfrm>
@@ -8009,43 +8281,6 @@
       </p:grpSp>
       <p:sp>
         <p:nvSpPr>
-          <p:cNvPr id="7" name="TextBox 6"/>
-          <p:cNvSpPr txBox="1"/>
-          <p:nvPr/>
-        </p:nvSpPr>
-        <p:spPr>
-          <a:xfrm>
-            <a:off x="1361396" y="4497470"/>
-            <a:ext cx="2127693" cy="369332"/>
-          </a:xfrm>
-          <a:prstGeom prst="rect">
-            <a:avLst/>
-          </a:prstGeom>
-          <a:noFill/>
-        </p:spPr>
-        <p:txBody>
-          <a:bodyPr wrap="square" rtlCol="0">
-            <a:spAutoFit/>
-          </a:bodyPr>
-          <a:lstStyle/>
-          <a:p>
-            <a:r>
-              <a:rPr lang="en-AU" dirty="0" smtClean="0"/>
-              <a:t>p &lt; 0.001, R</a:t>
-            </a:r>
-            <a:r>
-              <a:rPr lang="en-AU" baseline="30000" dirty="0" smtClean="0"/>
-              <a:t>2</a:t>
-            </a:r>
-            <a:r>
-              <a:rPr lang="en-AU" dirty="0" smtClean="0"/>
-              <a:t> = 0.49</a:t>
-            </a:r>
-          </a:p>
-        </p:txBody>
-      </p:sp>
-      <p:sp>
-        <p:nvSpPr>
           <p:cNvPr id="13" name="Title 1"/>
           <p:cNvSpPr txBox="1">
             <a:spLocks/>
@@ -8087,9 +8322,101 @@
           <a:p>
             <a:r>
               <a:rPr lang="en-AU" sz="3600" dirty="0" smtClean="0"/>
-              <a:t>Total protein content is greater at lower temperatures</a:t>
+              <a:t>Leaf protein </a:t>
+            </a:r>
+            <a:r>
+              <a:rPr lang="en-AU" sz="3600" dirty="0" smtClean="0"/>
+              <a:t>content is greater at lower temperatures</a:t>
             </a:r>
             <a:endParaRPr lang="en-AU" sz="3600" dirty="0"/>
+          </a:p>
+        </p:txBody>
+      </p:sp>
+      <p:sp>
+        <p:nvSpPr>
+          <p:cNvPr id="15" name="TextBox 14"/>
+          <p:cNvSpPr txBox="1"/>
+          <p:nvPr/>
+        </p:nvSpPr>
+        <p:spPr>
+          <a:xfrm>
+            <a:off x="1361396" y="4497470"/>
+            <a:ext cx="3368259" cy="369332"/>
+          </a:xfrm>
+          <a:prstGeom prst="rect">
+            <a:avLst/>
+          </a:prstGeom>
+          <a:noFill/>
+        </p:spPr>
+        <p:txBody>
+          <a:bodyPr wrap="square" rtlCol="0">
+            <a:spAutoFit/>
+          </a:bodyPr>
+          <a:lstStyle/>
+          <a:p>
+            <a:r>
+              <a:rPr lang="en-AU" dirty="0" smtClean="0"/>
+              <a:t>p &lt; 0.001, R</a:t>
+            </a:r>
+            <a:r>
+              <a:rPr lang="en-AU" baseline="30000" dirty="0" smtClean="0"/>
+              <a:t>2</a:t>
+            </a:r>
+            <a:r>
+              <a:rPr lang="en-AU" dirty="0" smtClean="0"/>
+              <a:t> = </a:t>
+            </a:r>
+            <a:r>
+              <a:rPr lang="en-AU" dirty="0" smtClean="0"/>
+              <a:t>0.49, 85 % decline</a:t>
+            </a:r>
+            <a:endParaRPr lang="en-AU" dirty="0" smtClean="0"/>
+          </a:p>
+        </p:txBody>
+      </p:sp>
+      <p:sp>
+        <p:nvSpPr>
+          <p:cNvPr id="17" name="TextBox 16"/>
+          <p:cNvSpPr txBox="1"/>
+          <p:nvPr/>
+        </p:nvSpPr>
+        <p:spPr>
+          <a:xfrm>
+            <a:off x="990600" y="5927835"/>
+            <a:ext cx="9803524" cy="369332"/>
+          </a:xfrm>
+          <a:prstGeom prst="rect">
+            <a:avLst/>
+          </a:prstGeom>
+          <a:noFill/>
+        </p:spPr>
+        <p:txBody>
+          <a:bodyPr wrap="square" rtlCol="0">
+            <a:spAutoFit/>
+          </a:bodyPr>
+          <a:lstStyle/>
+          <a:p>
+            <a:r>
+              <a:rPr lang="en-AU" dirty="0" smtClean="0"/>
+              <a:t>Leaf protein content varies 2.7-fold, </a:t>
+            </a:r>
+            <a:r>
+              <a:rPr lang="en-AU" dirty="0"/>
+              <a:t>between </a:t>
+            </a:r>
+            <a:r>
+              <a:rPr lang="en-AU" dirty="0" smtClean="0"/>
+              <a:t>17873 and 47639 mg / mm</a:t>
+            </a:r>
+            <a:r>
+              <a:rPr lang="en-AU" baseline="30000" dirty="0" smtClean="0"/>
+              <a:t>2</a:t>
+            </a:r>
+            <a:r>
+              <a:rPr lang="en-AU" dirty="0" smtClean="0"/>
+              <a:t> (mean = 29007, SD = 6550)</a:t>
+            </a:r>
+            <a:endParaRPr lang="en-AU" dirty="0"/>
           </a:p>
         </p:txBody>
       </p:sp>
@@ -8106,7 +8433,7 @@
 </p:sld>
 </file>
 
-<file path=ppt/slides/slide5.xml><?xml version="1.0" encoding="utf-8"?>
+<file path=ppt/slides/slide4.xml><?xml version="1.0" encoding="utf-8"?>
 <p:sld xmlns:a="http://schemas.openxmlformats.org/drawingml/2006/main" xmlns:r="http://schemas.openxmlformats.org/officeDocument/2006/relationships" xmlns:p="http://schemas.openxmlformats.org/presentationml/2006/main">
   <p:cSld>
     <p:spTree>
@@ -8237,7 +8564,7 @@
         <p:spPr>
           <a:xfrm>
             <a:off x="1361396" y="4497470"/>
-            <a:ext cx="2127693" cy="369332"/>
+            <a:ext cx="3368259" cy="369332"/>
           </a:xfrm>
           <a:prstGeom prst="rect">
             <a:avLst/>
@@ -8260,8 +8587,13 @@
             </a:r>
             <a:r>
               <a:rPr lang="en-AU" b="1" dirty="0" smtClean="0"/>
-              <a:t> = 0.49</a:t>
-            </a:r>
+              <a:t> = </a:t>
+            </a:r>
+            <a:r>
+              <a:rPr lang="en-AU" b="1" dirty="0" smtClean="0"/>
+              <a:t>0.49, 85 % decline</a:t>
+            </a:r>
+            <a:endParaRPr lang="en-AU" b="1" dirty="0" smtClean="0"/>
           </a:p>
         </p:txBody>
       </p:sp>
@@ -8460,9 +8792,59 @@
           <a:p>
             <a:r>
               <a:rPr lang="en-AU" sz="3600" dirty="0" smtClean="0"/>
-              <a:t>Total protein content is greater at lower temperatures</a:t>
+              <a:t>Leaf protein </a:t>
+            </a:r>
+            <a:r>
+              <a:rPr lang="en-AU" sz="3600" dirty="0" smtClean="0"/>
+              <a:t>content is greater at lower temperatures</a:t>
             </a:r>
             <a:endParaRPr lang="en-AU" sz="3600" dirty="0"/>
+          </a:p>
+        </p:txBody>
+      </p:sp>
+      <p:sp>
+        <p:nvSpPr>
+          <p:cNvPr id="18" name="TextBox 17"/>
+          <p:cNvSpPr txBox="1"/>
+          <p:nvPr/>
+        </p:nvSpPr>
+        <p:spPr>
+          <a:xfrm>
+            <a:off x="990600" y="5927835"/>
+            <a:ext cx="9803524" cy="369332"/>
+          </a:xfrm>
+          <a:prstGeom prst="rect">
+            <a:avLst/>
+          </a:prstGeom>
+          <a:noFill/>
+        </p:spPr>
+        <p:txBody>
+          <a:bodyPr wrap="square" rtlCol="0">
+            <a:spAutoFit/>
+          </a:bodyPr>
+          <a:lstStyle/>
+          <a:p>
+            <a:r>
+              <a:rPr lang="en-AU" dirty="0" smtClean="0"/>
+              <a:t>Leaf protein content varies 2.7-fold, </a:t>
+            </a:r>
+            <a:r>
+              <a:rPr lang="en-AU" dirty="0"/>
+              <a:t>between </a:t>
+            </a:r>
+            <a:r>
+              <a:rPr lang="en-AU" dirty="0" smtClean="0"/>
+              <a:t>17873 and 47639 mg / mm</a:t>
+            </a:r>
+            <a:r>
+              <a:rPr lang="en-AU" baseline="30000" dirty="0" smtClean="0"/>
+              <a:t>2</a:t>
+            </a:r>
+            <a:r>
+              <a:rPr lang="en-AU" dirty="0" smtClean="0"/>
+              <a:t> (mean = 29007, SD = 6550)</a:t>
+            </a:r>
+            <a:endParaRPr lang="en-AU" dirty="0"/>
           </a:p>
         </p:txBody>
       </p:sp>
@@ -8470,6 +8852,166 @@
     <p:extLst>
       <p:ext uri="{BB962C8B-B14F-4D97-AF65-F5344CB8AC3E}">
         <p14:creationId xmlns:p14="http://schemas.microsoft.com/office/powerpoint/2010/main" val="2613571687"/>
+      </p:ext>
+    </p:extLst>
+  </p:cSld>
+  <p:clrMapOvr>
+    <a:masterClrMapping/>
+  </p:clrMapOvr>
+</p:sld>
+</file>
+
+<file path=ppt/slides/slide5.xml><?xml version="1.0" encoding="utf-8"?>
+<p:sld xmlns:a="http://schemas.openxmlformats.org/drawingml/2006/main" xmlns:r="http://schemas.openxmlformats.org/officeDocument/2006/relationships" xmlns:p="http://schemas.openxmlformats.org/presentationml/2006/main">
+  <p:cSld>
+    <p:spTree>
+      <p:nvGrpSpPr>
+        <p:cNvPr id="1" name=""/>
+        <p:cNvGrpSpPr/>
+        <p:nvPr/>
+      </p:nvGrpSpPr>
+      <p:grpSpPr>
+        <a:xfrm>
+          <a:off x="0" y="0"/>
+          <a:ext cx="0" cy="0"/>
+          <a:chOff x="0" y="0"/>
+          <a:chExt cx="0" cy="0"/>
+        </a:xfrm>
+      </p:grpSpPr>
+      <p:sp>
+        <p:nvSpPr>
+          <p:cNvPr id="7" name="TextBox 6"/>
+          <p:cNvSpPr txBox="1"/>
+          <p:nvPr/>
+        </p:nvSpPr>
+        <p:spPr>
+          <a:xfrm>
+            <a:off x="993534" y="5590035"/>
+            <a:ext cx="3368259" cy="369332"/>
+          </a:xfrm>
+          <a:prstGeom prst="rect">
+            <a:avLst/>
+          </a:prstGeom>
+          <a:noFill/>
+        </p:spPr>
+        <p:txBody>
+          <a:bodyPr wrap="square" rtlCol="0">
+            <a:spAutoFit/>
+          </a:bodyPr>
+          <a:lstStyle/>
+          <a:p>
+            <a:r>
+              <a:rPr lang="en-AU" b="1" dirty="0" smtClean="0"/>
+              <a:t>p &lt; 0.001, R</a:t>
+            </a:r>
+            <a:r>
+              <a:rPr lang="en-AU" b="1" baseline="30000" dirty="0" smtClean="0"/>
+              <a:t>2</a:t>
+            </a:r>
+            <a:r>
+              <a:rPr lang="en-AU" b="1" dirty="0" smtClean="0"/>
+              <a:t> = </a:t>
+            </a:r>
+            <a:r>
+              <a:rPr lang="en-AU" b="1" dirty="0" smtClean="0"/>
+              <a:t>0.49, 85 % decline</a:t>
+            </a:r>
+            <a:endParaRPr lang="en-AU" b="1" dirty="0" smtClean="0"/>
+          </a:p>
+        </p:txBody>
+      </p:sp>
+      <p:sp>
+        <p:nvSpPr>
+          <p:cNvPr id="19" name="Title 1"/>
+          <p:cNvSpPr txBox="1">
+            <a:spLocks/>
+          </p:cNvSpPr>
+          <p:nvPr/>
+        </p:nvSpPr>
+        <p:spPr>
+          <a:xfrm>
+            <a:off x="94593" y="517525"/>
+            <a:ext cx="11992304" cy="1325563"/>
+          </a:xfrm>
+          <a:prstGeom prst="rect">
+            <a:avLst/>
+          </a:prstGeom>
+        </p:spPr>
+        <p:txBody>
+          <a:bodyPr vert="horz" lIns="91440" tIns="45720" rIns="91440" bIns="45720" rtlCol="0" anchor="ctr">
+            <a:normAutofit/>
+          </a:bodyPr>
+          <a:lstStyle>
+            <a:lvl1pPr algn="l" defTabSz="914400" rtl="0" eaLnBrk="1" latinLnBrk="0" hangingPunct="1">
+              <a:lnSpc>
+                <a:spcPct val="90000"/>
+              </a:lnSpc>
+              <a:spcBef>
+                <a:spcPct val="0"/>
+              </a:spcBef>
+              <a:buNone/>
+              <a:defRPr sz="4400" kern="1200">
+                <a:solidFill>
+                  <a:schemeClr val="tx1"/>
+                </a:solidFill>
+                <a:latin typeface="+mj-lt"/>
+                <a:ea typeface="+mj-ea"/>
+                <a:cs typeface="+mj-cs"/>
+              </a:defRPr>
+            </a:lvl1pPr>
+          </a:lstStyle>
+          <a:p>
+            <a:pPr algn="ctr"/>
+            <a:r>
+              <a:rPr lang="en-AU" sz="2800" dirty="0" smtClean="0"/>
+              <a:t>Photorespiration proteins are not more abundant at higher temperatures</a:t>
+            </a:r>
+            <a:endParaRPr lang="en-AU" sz="2800" dirty="0"/>
+          </a:p>
+        </p:txBody>
+      </p:sp>
+      <p:sp>
+        <p:nvSpPr>
+          <p:cNvPr id="14" name="TextBox 13"/>
+          <p:cNvSpPr txBox="1"/>
+          <p:nvPr/>
+        </p:nvSpPr>
+        <p:spPr>
+          <a:xfrm>
+            <a:off x="607638" y="5959367"/>
+            <a:ext cx="10982240" cy="369332"/>
+          </a:xfrm>
+          <a:prstGeom prst="rect">
+            <a:avLst/>
+          </a:prstGeom>
+          <a:noFill/>
+        </p:spPr>
+        <p:txBody>
+          <a:bodyPr wrap="square" rtlCol="0">
+            <a:spAutoFit/>
+          </a:bodyPr>
+          <a:lstStyle/>
+          <a:p>
+            <a:r>
+              <a:rPr lang="en-AU" dirty="0" smtClean="0"/>
+              <a:t>Photorespiration protein proportional abundance varies 2.5-fold, between 0.09 and 0.23 (mean </a:t>
+            </a:r>
+            <a:r>
+              <a:rPr lang="en-AU" dirty="0"/>
+              <a:t>= 0.16, </a:t>
+            </a:r>
+            <a:r>
+              <a:rPr lang="en-AU" dirty="0" smtClean="0"/>
+              <a:t>SD = 0.03) </a:t>
+            </a:r>
+            <a:endParaRPr lang="en-AU" dirty="0"/>
+          </a:p>
+        </p:txBody>
+      </p:sp>
+    </p:spTree>
+    <p:extLst>
+      <p:ext uri="{BB962C8B-B14F-4D97-AF65-F5344CB8AC3E}">
+        <p14:creationId xmlns:p14="http://schemas.microsoft.com/office/powerpoint/2010/main" val="1015504110"/>
       </p:ext>
     </p:extLst>
   </p:cSld>
@@ -8624,8 +9166,8 @@
         </p:nvSpPr>
         <p:spPr>
           <a:xfrm>
-            <a:off x="1111578" y="4540347"/>
-            <a:ext cx="2027548" cy="369332"/>
+            <a:off x="1111577" y="4540347"/>
+            <a:ext cx="3618077" cy="369332"/>
           </a:xfrm>
           <a:prstGeom prst="rect">
             <a:avLst/>
@@ -8648,7 +9190,11 @@
             </a:r>
             <a:r>
               <a:rPr lang="en-AU" dirty="0" smtClean="0"/>
-              <a:t> = 0.43</a:t>
+              <a:t> = </a:t>
+            </a:r>
+            <a:r>
+              <a:rPr lang="en-AU" dirty="0" smtClean="0"/>
+              <a:t>0.43, 54 % decline</a:t>
             </a:r>
             <a:endParaRPr lang="en-AU" dirty="0"/>
           </a:p>
@@ -8662,8 +9208,8 @@
         </p:nvSpPr>
         <p:spPr>
           <a:xfrm>
-            <a:off x="6846509" y="4540347"/>
-            <a:ext cx="2107878" cy="369332"/>
+            <a:off x="6846508" y="4540347"/>
+            <a:ext cx="3401077" cy="369332"/>
           </a:xfrm>
           <a:prstGeom prst="rect">
             <a:avLst/>
@@ -8686,7 +9232,11 @@
             </a:r>
             <a:r>
               <a:rPr lang="en-AU" dirty="0" smtClean="0"/>
-              <a:t> = 0.37</a:t>
+              <a:t> = </a:t>
+            </a:r>
+            <a:r>
+              <a:rPr lang="en-AU" dirty="0" smtClean="0"/>
+              <a:t>0.37, 42 % decline</a:t>
             </a:r>
             <a:endParaRPr lang="en-AU" dirty="0"/>
           </a:p>
@@ -8735,9 +9285,59 @@
           <a:p>
             <a:r>
               <a:rPr lang="en-AU" sz="3600" dirty="0" smtClean="0"/>
-              <a:t>Investment in photosystems is greater in low light</a:t>
+              <a:t>Allocatio</a:t>
+            </a:r>
+            <a:r>
+              <a:rPr lang="en-AU" sz="3600" dirty="0" smtClean="0"/>
+              <a:t>n to</a:t>
+            </a:r>
+            <a:r>
+              <a:rPr lang="en-AU" sz="3600" dirty="0" smtClean="0"/>
+              <a:t> </a:t>
+            </a:r>
+            <a:r>
+              <a:rPr lang="en-AU" sz="3600" dirty="0" smtClean="0"/>
+              <a:t>photosystems is greater in low light</a:t>
             </a:r>
             <a:endParaRPr lang="en-AU" sz="3600" dirty="0"/>
+          </a:p>
+        </p:txBody>
+      </p:sp>
+      <p:sp>
+        <p:nvSpPr>
+          <p:cNvPr id="12" name="TextBox 11"/>
+          <p:cNvSpPr txBox="1"/>
+          <p:nvPr/>
+        </p:nvSpPr>
+        <p:spPr>
+          <a:xfrm>
+            <a:off x="933286" y="5959367"/>
+            <a:ext cx="10656592" cy="369332"/>
+          </a:xfrm>
+          <a:prstGeom prst="rect">
+            <a:avLst/>
+          </a:prstGeom>
+          <a:noFill/>
+        </p:spPr>
+        <p:txBody>
+          <a:bodyPr wrap="square" rtlCol="0">
+            <a:spAutoFit/>
+          </a:bodyPr>
+          <a:lstStyle/>
+          <a:p>
+            <a:r>
+              <a:rPr lang="en-AU" dirty="0" smtClean="0"/>
+              <a:t>Photosystem protein proportional abundance varies 2.5-fold, between 0.09 and 0.23 (mean </a:t>
+            </a:r>
+            <a:r>
+              <a:rPr lang="en-AU" dirty="0"/>
+              <a:t>= 0.16, </a:t>
+            </a:r>
+            <a:r>
+              <a:rPr lang="en-AU" dirty="0" smtClean="0"/>
+              <a:t>SD = 0.03) </a:t>
+            </a:r>
+            <a:endParaRPr lang="en-AU" dirty="0"/>
           </a:p>
         </p:txBody>
       </p:sp>
@@ -8833,82 +9433,6 @@
       </p:pic>
       <p:sp>
         <p:nvSpPr>
-          <p:cNvPr id="7" name="TextBox 6"/>
-          <p:cNvSpPr txBox="1"/>
-          <p:nvPr/>
-        </p:nvSpPr>
-        <p:spPr>
-          <a:xfrm>
-            <a:off x="1111578" y="4540347"/>
-            <a:ext cx="2027548" cy="369332"/>
-          </a:xfrm>
-          <a:prstGeom prst="rect">
-            <a:avLst/>
-          </a:prstGeom>
-          <a:noFill/>
-        </p:spPr>
-        <p:txBody>
-          <a:bodyPr wrap="square" rtlCol="0">
-            <a:spAutoFit/>
-          </a:bodyPr>
-          <a:lstStyle/>
-          <a:p>
-            <a:r>
-              <a:rPr lang="en-AU" b="1" dirty="0" smtClean="0"/>
-              <a:t>p &lt; 0.001, R</a:t>
-            </a:r>
-            <a:r>
-              <a:rPr lang="en-AU" b="1" baseline="30000" dirty="0" smtClean="0"/>
-              <a:t>2</a:t>
-            </a:r>
-            <a:r>
-              <a:rPr lang="en-AU" b="1" dirty="0" smtClean="0"/>
-              <a:t> = 0.43</a:t>
-            </a:r>
-            <a:endParaRPr lang="en-AU" b="1" dirty="0"/>
-          </a:p>
-        </p:txBody>
-      </p:sp>
-      <p:sp>
-        <p:nvSpPr>
-          <p:cNvPr id="8" name="TextBox 7"/>
-          <p:cNvSpPr txBox="1"/>
-          <p:nvPr/>
-        </p:nvSpPr>
-        <p:spPr>
-          <a:xfrm>
-            <a:off x="6846509" y="4540347"/>
-            <a:ext cx="2107878" cy="369332"/>
-          </a:xfrm>
-          <a:prstGeom prst="rect">
-            <a:avLst/>
-          </a:prstGeom>
-          <a:noFill/>
-        </p:spPr>
-        <p:txBody>
-          <a:bodyPr wrap="square" rtlCol="0">
-            <a:spAutoFit/>
-          </a:bodyPr>
-          <a:lstStyle/>
-          <a:p>
-            <a:r>
-              <a:rPr lang="en-AU" b="1" dirty="0" smtClean="0"/>
-              <a:t>p &lt; 0.001, R</a:t>
-            </a:r>
-            <a:r>
-              <a:rPr lang="en-AU" b="1" baseline="30000" dirty="0" smtClean="0"/>
-              <a:t>2</a:t>
-            </a:r>
-            <a:r>
-              <a:rPr lang="en-AU" b="1" dirty="0" smtClean="0"/>
-              <a:t> = 0.37</a:t>
-            </a:r>
-            <a:endParaRPr lang="en-AU" b="1" dirty="0"/>
-          </a:p>
-        </p:txBody>
-      </p:sp>
-      <p:sp>
-        <p:nvSpPr>
           <p:cNvPr id="12" name="Rectangle 11"/>
           <p:cNvSpPr/>
           <p:nvPr/>
@@ -9102,7 +9626,7 @@
           <a:p>
             <a:r>
               <a:rPr lang="en-AU" sz="3600" dirty="0" smtClean="0"/>
-              <a:t>Investment in photosystems is greater in low light</a:t>
+              <a:t>Allocation to photosystems is greater in low light</a:t>
             </a:r>
             <a:endParaRPr lang="en-AU" sz="3600" dirty="0"/>
           </a:p>
@@ -9110,14 +9634,14 @@
       </p:sp>
       <p:sp>
         <p:nvSpPr>
-          <p:cNvPr id="18" name="TextBox 17"/>
+          <p:cNvPr id="19" name="TextBox 18"/>
           <p:cNvSpPr txBox="1"/>
           <p:nvPr/>
         </p:nvSpPr>
         <p:spPr>
           <a:xfrm>
-            <a:off x="1668544" y="5872899"/>
-            <a:ext cx="7371761" cy="369332"/>
+            <a:off x="1111577" y="4540347"/>
+            <a:ext cx="3618077" cy="369332"/>
           </a:xfrm>
           <a:prstGeom prst="rect">
             <a:avLst/>
@@ -9131,8 +9655,100 @@
           <a:lstStyle/>
           <a:p>
             <a:r>
+              <a:rPr lang="en-AU" b="1" dirty="0" smtClean="0"/>
+              <a:t>p &lt; 0.001, R</a:t>
+            </a:r>
+            <a:r>
+              <a:rPr lang="en-AU" b="1" baseline="30000" dirty="0" smtClean="0"/>
+              <a:t>2</a:t>
+            </a:r>
+            <a:r>
+              <a:rPr lang="en-AU" b="1" dirty="0" smtClean="0"/>
+              <a:t> = </a:t>
+            </a:r>
+            <a:r>
+              <a:rPr lang="en-AU" b="1" dirty="0" smtClean="0"/>
+              <a:t>0.43, 54 % decline</a:t>
+            </a:r>
+            <a:endParaRPr lang="en-AU" b="1" dirty="0"/>
+          </a:p>
+        </p:txBody>
+      </p:sp>
+      <p:sp>
+        <p:nvSpPr>
+          <p:cNvPr id="20" name="TextBox 19"/>
+          <p:cNvSpPr txBox="1"/>
+          <p:nvPr/>
+        </p:nvSpPr>
+        <p:spPr>
+          <a:xfrm>
+            <a:off x="6846508" y="4540347"/>
+            <a:ext cx="3401077" cy="369332"/>
+          </a:xfrm>
+          <a:prstGeom prst="rect">
+            <a:avLst/>
+          </a:prstGeom>
+          <a:noFill/>
+        </p:spPr>
+        <p:txBody>
+          <a:bodyPr wrap="square" rtlCol="0">
+            <a:spAutoFit/>
+          </a:bodyPr>
+          <a:lstStyle/>
+          <a:p>
+            <a:r>
+              <a:rPr lang="en-AU" b="1" dirty="0" smtClean="0"/>
+              <a:t>p &lt; 0.001, R</a:t>
+            </a:r>
+            <a:r>
+              <a:rPr lang="en-AU" b="1" baseline="30000" dirty="0" smtClean="0"/>
+              <a:t>2</a:t>
+            </a:r>
+            <a:r>
+              <a:rPr lang="en-AU" b="1" dirty="0" smtClean="0"/>
+              <a:t> = </a:t>
+            </a:r>
+            <a:r>
+              <a:rPr lang="en-AU" b="1" dirty="0" smtClean="0"/>
+              <a:t>0.37, 42 % decline</a:t>
+            </a:r>
+            <a:endParaRPr lang="en-AU" b="1" dirty="0"/>
+          </a:p>
+        </p:txBody>
+      </p:sp>
+      <p:sp>
+        <p:nvSpPr>
+          <p:cNvPr id="23" name="TextBox 22"/>
+          <p:cNvSpPr txBox="1"/>
+          <p:nvPr/>
+        </p:nvSpPr>
+        <p:spPr>
+          <a:xfrm>
+            <a:off x="933286" y="5959367"/>
+            <a:ext cx="10656592" cy="369332"/>
+          </a:xfrm>
+          <a:prstGeom prst="rect">
+            <a:avLst/>
+          </a:prstGeom>
+          <a:noFill/>
+        </p:spPr>
+        <p:txBody>
+          <a:bodyPr wrap="square" rtlCol="0">
+            <a:spAutoFit/>
+          </a:bodyPr>
+          <a:lstStyle/>
+          <a:p>
+            <a:r>
               <a:rPr lang="en-AU" dirty="0" smtClean="0"/>
-              <a:t>X-fold variation in photosystem protein abundance</a:t>
+              <a:t>Photosystem protein proportional abundance varies 2.5-fold, between 0.09 and 0.23 (mean </a:t>
+            </a:r>
+            <a:r>
+              <a:rPr lang="en-AU" dirty="0"/>
+              <a:t>= 0.16, </a:t>
+            </a:r>
+            <a:r>
+              <a:rPr lang="en-AU" dirty="0" smtClean="0"/>
+              <a:t>SD = 0.03) </a:t>
             </a:r>
             <a:endParaRPr lang="en-AU" dirty="0"/>
           </a:p>

</xml_diff>